<commit_message>
Update talk for MARS.
</commit_message>
<xml_diff>
--- a/slides/2016-03-21-amazonMars.pptx
+++ b/slides/2016-03-21-amazonMars.pptx
@@ -218,7 +218,7 @@
           <a:p>
             <a:fld id="{5267B68B-15A1-49EF-B0E6-1470D34B92C5}" type="datetimeFigureOut">
               <a:rPr lang="en-US" smtClean="0"/>
-              <a:t>3/19/2016</a:t>
+              <a:t>3/20/2016</a:t>
             </a:fld>
             <a:endParaRPr lang="en-US"/>
           </a:p>
@@ -650,7 +650,79 @@
                 <a:ea typeface="+mn-ea"/>
                 <a:cs typeface="+mn-cs"/>
               </a:rPr>
-              <a:t> result is extremely impressive. But as Oren mentioned it was achieved through enormous computer power. The machine built its value network from every professional game of Go ever recorded, it then honed it through millions of games played against itself. </a:t>
+              <a:t> result is extremely impressive. But as Oren mentioned it was achieved through enormous computer power. The machine built its value </a:t>
+            </a:r>
+            <a:r>
+              <a:rPr lang="en-US" sz="1200" kern="1200" baseline="0" dirty="0" smtClean="0">
+                <a:solidFill>
+                  <a:schemeClr val="tx1"/>
+                </a:solidFill>
+                <a:effectLst/>
+                <a:latin typeface="+mn-lt"/>
+                <a:ea typeface="+mn-ea"/>
+                <a:cs typeface="+mn-cs"/>
+              </a:rPr>
+              <a:t>network, its intuition, </a:t>
+            </a:r>
+            <a:r>
+              <a:rPr lang="en-US" sz="1200" kern="1200" baseline="0" dirty="0" smtClean="0">
+                <a:solidFill>
+                  <a:schemeClr val="tx1"/>
+                </a:solidFill>
+                <a:effectLst/>
+                <a:latin typeface="+mn-lt"/>
+                <a:ea typeface="+mn-ea"/>
+                <a:cs typeface="+mn-cs"/>
+              </a:rPr>
+              <a:t>from every </a:t>
+            </a:r>
+            <a:r>
+              <a:rPr lang="en-US" sz="1200" kern="1200" baseline="0" dirty="0" smtClean="0">
+                <a:solidFill>
+                  <a:schemeClr val="tx1"/>
+                </a:solidFill>
+                <a:effectLst/>
+                <a:latin typeface="+mn-lt"/>
+                <a:ea typeface="+mn-ea"/>
+                <a:cs typeface="+mn-cs"/>
+              </a:rPr>
+              <a:t>recorded professional </a:t>
+            </a:r>
+            <a:r>
+              <a:rPr lang="en-US" sz="1200" kern="1200" baseline="0" dirty="0" smtClean="0">
+                <a:solidFill>
+                  <a:schemeClr val="tx1"/>
+                </a:solidFill>
+                <a:effectLst/>
+                <a:latin typeface="+mn-lt"/>
+                <a:ea typeface="+mn-ea"/>
+                <a:cs typeface="+mn-cs"/>
+              </a:rPr>
+              <a:t>game of </a:t>
+            </a:r>
+            <a:r>
+              <a:rPr lang="en-US" sz="1200" kern="1200" baseline="0" dirty="0" smtClean="0">
+                <a:solidFill>
+                  <a:schemeClr val="tx1"/>
+                </a:solidFill>
+                <a:effectLst/>
+                <a:latin typeface="+mn-lt"/>
+                <a:ea typeface="+mn-ea"/>
+                <a:cs typeface="+mn-cs"/>
+              </a:rPr>
+              <a:t>Go, </a:t>
+            </a:r>
+            <a:r>
+              <a:rPr lang="en-US" sz="1200" kern="1200" baseline="0" dirty="0" smtClean="0">
+                <a:solidFill>
+                  <a:schemeClr val="tx1"/>
+                </a:solidFill>
+                <a:effectLst/>
+                <a:latin typeface="+mn-lt"/>
+                <a:ea typeface="+mn-ea"/>
+                <a:cs typeface="+mn-cs"/>
+              </a:rPr>
+              <a:t>it then honed it through millions of games played against itself. </a:t>
             </a:r>
           </a:p>
           <a:p>
@@ -716,7 +788,31 @@
                 <a:ea typeface="+mn-ea"/>
                 <a:cs typeface="+mn-cs"/>
               </a:rPr>
-              <a:t> had already played many more games of Go than any human could possibly play in their lifetime. Indeed, even between it’s match with the European Champion and the $1 million dollar challenge</a:t>
+              <a:t> had already played many more games of Go than any human could possibly play in their lifetime. Indeed, even between </a:t>
+            </a:r>
+            <a:r>
+              <a:rPr lang="en-US" sz="1200" kern="1200" dirty="0" smtClean="0">
+                <a:solidFill>
+                  <a:schemeClr val="tx1"/>
+                </a:solidFill>
+                <a:effectLst/>
+                <a:latin typeface="+mn-lt"/>
+                <a:ea typeface="+mn-ea"/>
+                <a:cs typeface="+mn-cs"/>
+              </a:rPr>
+              <a:t>its </a:t>
+            </a:r>
+            <a:r>
+              <a:rPr lang="en-US" sz="1200" kern="1200" dirty="0" smtClean="0">
+                <a:solidFill>
+                  <a:schemeClr val="tx1"/>
+                </a:solidFill>
+                <a:effectLst/>
+                <a:latin typeface="+mn-lt"/>
+                <a:ea typeface="+mn-ea"/>
+                <a:cs typeface="+mn-cs"/>
+              </a:rPr>
+              <a:t>match with the European Champion and the $1 million dollar challenge</a:t>
             </a:r>
             <a:r>
               <a:rPr lang="en-US" sz="1200" kern="1200" baseline="0" dirty="0" smtClean="0">
@@ -1071,7 +1167,7 @@
               </a:p>
               <a:p>
                 <a:r>
-                  <a:rPr lang="en-US" sz="1200" kern="1200" dirty="0">
+                  <a:rPr lang="en-US" sz="1200" kern="1200" dirty="0" smtClean="0">
                     <a:solidFill>
                       <a:schemeClr val="tx1"/>
                     </a:solidFill>
@@ -1080,36 +1176,32 @@
                     <a:ea typeface="+mn-ea"/>
                     <a:cs typeface="+mn-cs"/>
                   </a:rPr>
-                  <a:t>So for tractability the functions </a:t>
+                  <a:t>This</a:t>
                 </a:r>
-                <a14:m>
-                  <m:oMath xmlns:m="http://schemas.openxmlformats.org/officeDocument/2006/math">
-                    <m:r>
-                      <a:rPr lang="en-US" sz="1200" i="1" kern="1200">
-                        <a:solidFill>
-                          <a:schemeClr val="tx1"/>
-                        </a:solidFill>
-                        <a:effectLst/>
-                        <a:latin typeface="Cambria Math" panose="02040503050406030204" pitchFamily="18" charset="0"/>
-                        <a:ea typeface="+mn-ea"/>
-                        <a:cs typeface="+mn-cs"/>
-                      </a:rPr>
-                      <m:t>𝑓</m:t>
-                    </m:r>
-                    <m:r>
-                      <a:rPr lang="en-US" sz="1200" i="1" kern="1200">
-                        <a:solidFill>
-                          <a:schemeClr val="tx1"/>
-                        </a:solidFill>
-                        <a:effectLst/>
-                        <a:latin typeface="Cambria Math" panose="02040503050406030204" pitchFamily="18" charset="0"/>
-                        <a:ea typeface="+mn-ea"/>
-                        <a:cs typeface="+mn-cs"/>
-                      </a:rPr>
-                      <m:t>(⋅)</m:t>
-                    </m:r>
-                  </m:oMath>
-                </a14:m>
+                <a:r>
+                  <a:rPr lang="en-US" sz="1200" kern="1200" baseline="0" dirty="0" smtClean="0">
+                    <a:solidFill>
+                      <a:schemeClr val="tx1"/>
+                    </a:solidFill>
+                    <a:effectLst/>
+                    <a:latin typeface="+mn-lt"/>
+                    <a:ea typeface="+mn-ea"/>
+                    <a:cs typeface="+mn-cs"/>
+                  </a:rPr>
+                  <a:t> means that deep networks only need to be differentiable for training,</a:t>
+                </a:r>
+                <a:r>
+                  <a:rPr lang="en-US" sz="1200" kern="1200" dirty="0" smtClean="0">
+                    <a:solidFill>
+                      <a:schemeClr val="tx1"/>
+                    </a:solidFill>
+                    <a:effectLst/>
+                    <a:latin typeface="+mn-lt"/>
+                    <a:ea typeface="+mn-ea"/>
+                    <a:cs typeface="+mn-cs"/>
+                  </a:rPr>
+                  <a:t> thus </a:t>
+                </a:r>
                 <a:r>
                   <a:rPr lang="en-US" sz="1200" kern="1200" dirty="0">
                     <a:solidFill>
@@ -1120,7 +1212,7 @@
                     <a:ea typeface="+mn-ea"/>
                     <a:cs typeface="+mn-cs"/>
                   </a:rPr>
-                  <a:t> just need to be differentiable. Thus the domination of backpropagation algorithms. The main implementation worry is the challenge of gradients fading as the network gets deeper.</a:t>
+                  <a:t>the domination of backpropagation algorithms. The main implementation worry is the challenge of gradients fading as the network gets deeper.</a:t>
                 </a:r>
                 <a:endParaRPr lang="en-GB" sz="1200" kern="1200" dirty="0">
                   <a:solidFill>
@@ -1619,10 +1711,92 @@
                 <a:ea typeface="+mn-ea"/>
                 <a:cs typeface="+mn-cs"/>
               </a:rPr>
-              <a:t> On the left, the amount of useful work the system can do, on the right the internal energy minus the entropy. </a:t>
-            </a:r>
-          </a:p>
-          <a:p>
+              <a:t> On the left, </a:t>
+            </a:r>
+            <a:r>
+              <a:rPr lang="en-US" sz="1200" kern="1200" baseline="0" dirty="0" smtClean="0">
+                <a:solidFill>
+                  <a:schemeClr val="tx1"/>
+                </a:solidFill>
+                <a:effectLst/>
+                <a:latin typeface="+mn-lt"/>
+                <a:ea typeface="+mn-ea"/>
+                <a:cs typeface="+mn-cs"/>
+              </a:rPr>
+              <a:t>A stands for </a:t>
+            </a:r>
+            <a:r>
+              <a:rPr lang="en-US" sz="1200" kern="1200" baseline="0" dirty="0" err="1" smtClean="0">
+                <a:solidFill>
+                  <a:schemeClr val="tx1"/>
+                </a:solidFill>
+                <a:effectLst/>
+                <a:latin typeface="+mn-lt"/>
+                <a:ea typeface="+mn-ea"/>
+                <a:cs typeface="+mn-cs"/>
+              </a:rPr>
+              <a:t>Arbeit</a:t>
+            </a:r>
+            <a:r>
+              <a:rPr lang="en-US" sz="1200" kern="1200" baseline="0" dirty="0" smtClean="0">
+                <a:solidFill>
+                  <a:schemeClr val="tx1"/>
+                </a:solidFill>
+                <a:effectLst/>
+                <a:latin typeface="+mn-lt"/>
+                <a:ea typeface="+mn-ea"/>
+                <a:cs typeface="+mn-cs"/>
+              </a:rPr>
+              <a:t>: the </a:t>
+            </a:r>
+            <a:r>
+              <a:rPr lang="en-US" sz="1200" kern="1200" baseline="0" dirty="0" smtClean="0">
+                <a:solidFill>
+                  <a:schemeClr val="tx1"/>
+                </a:solidFill>
+                <a:effectLst/>
+                <a:latin typeface="+mn-lt"/>
+                <a:ea typeface="+mn-ea"/>
+                <a:cs typeface="+mn-cs"/>
+              </a:rPr>
+              <a:t>amount of useful work </a:t>
+            </a:r>
+            <a:r>
+              <a:rPr lang="en-US" sz="1200" kern="1200" baseline="0" dirty="0" smtClean="0">
+                <a:solidFill>
+                  <a:schemeClr val="tx1"/>
+                </a:solidFill>
+                <a:effectLst/>
+                <a:latin typeface="+mn-lt"/>
+                <a:ea typeface="+mn-ea"/>
+                <a:cs typeface="+mn-cs"/>
+              </a:rPr>
+              <a:t>a </a:t>
+            </a:r>
+            <a:r>
+              <a:rPr lang="en-US" sz="1200" kern="1200" baseline="0" dirty="0" smtClean="0">
+                <a:solidFill>
+                  <a:schemeClr val="tx1"/>
+                </a:solidFill>
+                <a:effectLst/>
+                <a:latin typeface="+mn-lt"/>
+                <a:ea typeface="+mn-ea"/>
+                <a:cs typeface="+mn-cs"/>
+              </a:rPr>
+              <a:t>system can do, on the right the </a:t>
+            </a:r>
+            <a:r>
+              <a:rPr lang="en-US" sz="1200" kern="1200" baseline="0" dirty="0" smtClean="0">
+                <a:solidFill>
+                  <a:schemeClr val="tx1"/>
+                </a:solidFill>
+                <a:effectLst/>
+                <a:latin typeface="+mn-lt"/>
+                <a:ea typeface="+mn-ea"/>
+                <a:cs typeface="+mn-cs"/>
+              </a:rPr>
+              <a:t>U stands for internal energy, the T temperature and S entropy. </a:t>
+            </a:r>
             <a:endParaRPr lang="en-US" sz="1200" kern="1200" baseline="0" dirty="0" smtClean="0">
               <a:solidFill>
                 <a:schemeClr val="tx1"/>
@@ -1634,6 +1808,17 @@
             </a:endParaRPr>
           </a:p>
           <a:p>
+            <a:endParaRPr lang="en-US" sz="1200" kern="1200" baseline="0" dirty="0" smtClean="0">
+              <a:solidFill>
+                <a:schemeClr val="tx1"/>
+              </a:solidFill>
+              <a:effectLst/>
+              <a:latin typeface="+mn-lt"/>
+              <a:ea typeface="+mn-ea"/>
+              <a:cs typeface="+mn-cs"/>
+            </a:endParaRPr>
+          </a:p>
+          <a:p>
             <a:r>
               <a:rPr lang="en-US" sz="1200" kern="1200" baseline="0" dirty="0" smtClean="0">
                 <a:solidFill>
@@ -1644,7 +1829,31 @@
                 <a:ea typeface="+mn-ea"/>
                 <a:cs typeface="+mn-cs"/>
               </a:rPr>
-              <a:t>This formula arrives more than a century after Watt developed the separate condenser. </a:t>
+              <a:t>This formula </a:t>
+            </a:r>
+            <a:r>
+              <a:rPr lang="en-US" sz="1200" kern="1200" baseline="0" dirty="0" smtClean="0">
+                <a:solidFill>
+                  <a:schemeClr val="tx1"/>
+                </a:solidFill>
+                <a:effectLst/>
+                <a:latin typeface="+mn-lt"/>
+                <a:ea typeface="+mn-ea"/>
+                <a:cs typeface="+mn-cs"/>
+              </a:rPr>
+              <a:t>arrived </a:t>
+            </a:r>
+            <a:r>
+              <a:rPr lang="en-US" sz="1200" kern="1200" baseline="0" dirty="0" smtClean="0">
+                <a:solidFill>
+                  <a:schemeClr val="tx1"/>
+                </a:solidFill>
+                <a:effectLst/>
+                <a:latin typeface="+mn-lt"/>
+                <a:ea typeface="+mn-ea"/>
+                <a:cs typeface="+mn-cs"/>
+              </a:rPr>
+              <a:t>more than a century after Watt developed the separate condenser. </a:t>
             </a:r>
             <a:r>
               <a:rPr lang="en-US" sz="1200" kern="1200" dirty="0" smtClean="0">
@@ -1656,31 +1865,7 @@
                 <a:ea typeface="+mn-ea"/>
                 <a:cs typeface="+mn-cs"/>
               </a:rPr>
-              <a:t>It </a:t>
-            </a:r>
-            <a:r>
-              <a:rPr lang="en-US" sz="1200" kern="1200" dirty="0" smtClean="0">
-                <a:solidFill>
-                  <a:schemeClr val="tx1"/>
-                </a:solidFill>
-                <a:effectLst/>
-                <a:latin typeface="+mn-lt"/>
-                <a:ea typeface="+mn-ea"/>
-                <a:cs typeface="+mn-cs"/>
-              </a:rPr>
-              <a:t>took a long time for the theory of thermodynamics to catch up with Watt's </a:t>
-            </a:r>
-            <a:r>
-              <a:rPr lang="en-US" sz="1200" kern="1200" dirty="0" smtClean="0">
-                <a:solidFill>
-                  <a:schemeClr val="tx1"/>
-                </a:solidFill>
-                <a:effectLst/>
-                <a:latin typeface="+mn-lt"/>
-                <a:ea typeface="+mn-ea"/>
-                <a:cs typeface="+mn-cs"/>
-              </a:rPr>
-              <a:t>implementation. </a:t>
+              <a:t>It took a long time for the theory of thermodynamics to catch up with Watt's implementation. </a:t>
             </a:r>
           </a:p>
           <a:p>
@@ -1705,7 +1890,7 @@
                 <a:ea typeface="+mn-ea"/>
                 <a:cs typeface="+mn-cs"/>
               </a:rPr>
-              <a:t>But a </a:t>
+              <a:t>But a deep understanding of thermodynamics is vital to our modern </a:t>
             </a:r>
             <a:r>
               <a:rPr lang="en-US" sz="1200" kern="1200" dirty="0" smtClean="0">
@@ -1717,68 +1902,17 @@
                 <a:ea typeface="+mn-ea"/>
                 <a:cs typeface="+mn-cs"/>
               </a:rPr>
-              <a:t>deep understanding of thermodynamics </a:t>
-            </a:r>
-            <a:r>
-              <a:rPr lang="en-US" sz="1200" kern="1200" dirty="0" smtClean="0">
-                <a:solidFill>
-                  <a:schemeClr val="tx1"/>
-                </a:solidFill>
-                <a:effectLst/>
-                <a:latin typeface="+mn-lt"/>
-                <a:ea typeface="+mn-ea"/>
-                <a:cs typeface="+mn-cs"/>
-              </a:rPr>
-              <a:t>is </a:t>
-            </a:r>
-            <a:r>
-              <a:rPr lang="en-US" sz="1200" kern="1200" dirty="0" smtClean="0">
-                <a:solidFill>
-                  <a:schemeClr val="tx1"/>
-                </a:solidFill>
-                <a:effectLst/>
-                <a:latin typeface="+mn-lt"/>
-                <a:ea typeface="+mn-ea"/>
-                <a:cs typeface="+mn-cs"/>
-              </a:rPr>
-              <a:t>vital to </a:t>
-            </a:r>
-            <a:r>
-              <a:rPr lang="en-US" sz="1200" kern="1200" dirty="0" smtClean="0">
-                <a:solidFill>
-                  <a:schemeClr val="tx1"/>
-                </a:solidFill>
-                <a:effectLst/>
-                <a:latin typeface="+mn-lt"/>
-                <a:ea typeface="+mn-ea"/>
-                <a:cs typeface="+mn-cs"/>
-              </a:rPr>
-              <a:t>our </a:t>
-            </a:r>
-            <a:r>
-              <a:rPr lang="en-US" sz="1200" kern="1200" dirty="0" smtClean="0">
-                <a:solidFill>
-                  <a:schemeClr val="tx1"/>
-                </a:solidFill>
-                <a:effectLst/>
-                <a:latin typeface="+mn-lt"/>
-                <a:ea typeface="+mn-ea"/>
-                <a:cs typeface="+mn-cs"/>
-              </a:rPr>
-              <a:t>modern </a:t>
-            </a:r>
-            <a:r>
-              <a:rPr lang="en-US" sz="1200" kern="1200" dirty="0" smtClean="0">
-                <a:solidFill>
-                  <a:schemeClr val="tx1"/>
-                </a:solidFill>
-                <a:effectLst/>
-                <a:latin typeface="+mn-lt"/>
-                <a:ea typeface="+mn-ea"/>
-                <a:cs typeface="+mn-cs"/>
-              </a:rPr>
-              <a:t>world</a:t>
-            </a:r>
+              <a:t>world.</a:t>
+            </a:r>
+            <a:endParaRPr lang="en-US" sz="1200" kern="1200" dirty="0" smtClean="0">
+              <a:solidFill>
+                <a:schemeClr val="tx1"/>
+              </a:solidFill>
+              <a:effectLst/>
+              <a:latin typeface="+mn-lt"/>
+              <a:ea typeface="+mn-ea"/>
+              <a:cs typeface="+mn-cs"/>
+            </a:endParaRPr>
           </a:p>
           <a:p>
             <a:endParaRPr lang="en-GB" sz="1200" kern="1200" dirty="0" smtClean="0">
@@ -1896,7 +2030,19 @@
                 <a:ea typeface="+mn-ea"/>
                 <a:cs typeface="+mn-cs"/>
               </a:rPr>
-              <a:t>One </a:t>
+              <a:t>One extremely promising approach to solving our</a:t>
+            </a:r>
+            <a:r>
+              <a:rPr lang="en-US" sz="1200" kern="1200" baseline="0" dirty="0" smtClean="0">
+                <a:solidFill>
+                  <a:schemeClr val="tx1"/>
+                </a:solidFill>
+                <a:effectLst/>
+                <a:latin typeface="+mn-lt"/>
+                <a:ea typeface="+mn-ea"/>
+                <a:cs typeface="+mn-cs"/>
+              </a:rPr>
+              <a:t> path</a:t>
             </a:r>
             <a:r>
               <a:rPr lang="en-US" sz="1200" kern="1200" dirty="0" smtClean="0">
@@ -1908,7 +2054,19 @@
                 <a:ea typeface="+mn-ea"/>
                 <a:cs typeface="+mn-cs"/>
               </a:rPr>
-              <a:t>extremely promising approach to solving </a:t>
+              <a:t> integrals is the use of </a:t>
+            </a:r>
+            <a:r>
+              <a:rPr lang="en-US" sz="1200" kern="1200" dirty="0" err="1" smtClean="0">
+                <a:solidFill>
+                  <a:schemeClr val="tx1"/>
+                </a:solidFill>
+                <a:effectLst/>
+                <a:latin typeface="+mn-lt"/>
+                <a:ea typeface="+mn-ea"/>
+                <a:cs typeface="+mn-cs"/>
+              </a:rPr>
+              <a:t>variational</a:t>
             </a:r>
             <a:r>
               <a:rPr lang="en-US" sz="1200" kern="1200" dirty="0" smtClean="0">
@@ -1920,7 +2078,19 @@
                 <a:ea typeface="+mn-ea"/>
                 <a:cs typeface="+mn-cs"/>
               </a:rPr>
-              <a:t>our</a:t>
+              <a:t> methods. These decompose the path integral into parts that can be </a:t>
+            </a:r>
+            <a:r>
+              <a:rPr lang="en-US" sz="1200" kern="1200" dirty="0" smtClean="0">
+                <a:solidFill>
+                  <a:schemeClr val="tx1"/>
+                </a:solidFill>
+                <a:effectLst/>
+                <a:latin typeface="+mn-lt"/>
+                <a:ea typeface="+mn-ea"/>
+                <a:cs typeface="+mn-cs"/>
+              </a:rPr>
+              <a:t>replaced by optimizable approximations. In the end they allow</a:t>
             </a:r>
             <a:r>
               <a:rPr lang="en-US" sz="1200" kern="1200" baseline="0" dirty="0" smtClean="0">
@@ -1932,7 +2102,7 @@
                 <a:ea typeface="+mn-ea"/>
                 <a:cs typeface="+mn-cs"/>
               </a:rPr>
-              <a:t> path</a:t>
+              <a:t> </a:t>
             </a:r>
             <a:r>
               <a:rPr lang="en-US" sz="1200" kern="1200" dirty="0" smtClean="0">
@@ -1944,6 +2114,30 @@
                 <a:ea typeface="+mn-ea"/>
                 <a:cs typeface="+mn-cs"/>
               </a:rPr>
+              <a:t>us </a:t>
+            </a:r>
+            <a:r>
+              <a:rPr lang="en-US" sz="1200" kern="1200" dirty="0" smtClean="0">
+                <a:solidFill>
+                  <a:schemeClr val="tx1"/>
+                </a:solidFill>
+                <a:effectLst/>
+                <a:latin typeface="+mn-lt"/>
+                <a:ea typeface="+mn-ea"/>
+                <a:cs typeface="+mn-cs"/>
+              </a:rPr>
+              <a:t>to return to the world of</a:t>
+            </a:r>
+            <a:r>
+              <a:rPr lang="en-US" sz="1200" kern="1200" baseline="0" dirty="0" smtClean="0">
+                <a:solidFill>
+                  <a:schemeClr val="tx1"/>
+                </a:solidFill>
+                <a:effectLst/>
+                <a:latin typeface="+mn-lt"/>
+                <a:ea typeface="+mn-ea"/>
+                <a:cs typeface="+mn-cs"/>
+              </a:rPr>
               <a:t> </a:t>
             </a:r>
             <a:r>
@@ -1956,43 +2150,7 @@
                 <a:ea typeface="+mn-ea"/>
                 <a:cs typeface="+mn-cs"/>
               </a:rPr>
-              <a:t>integrals is the use of </a:t>
-            </a:r>
-            <a:r>
-              <a:rPr lang="en-US" sz="1200" kern="1200" dirty="0" err="1" smtClean="0">
-                <a:solidFill>
-                  <a:schemeClr val="tx1"/>
-                </a:solidFill>
-                <a:effectLst/>
-                <a:latin typeface="+mn-lt"/>
-                <a:ea typeface="+mn-ea"/>
-                <a:cs typeface="+mn-cs"/>
-              </a:rPr>
-              <a:t>variational</a:t>
-            </a:r>
-            <a:r>
-              <a:rPr lang="en-US" sz="1200" kern="1200" dirty="0" smtClean="0">
-                <a:solidFill>
-                  <a:schemeClr val="tx1"/>
-                </a:solidFill>
-                <a:effectLst/>
-                <a:latin typeface="+mn-lt"/>
-                <a:ea typeface="+mn-ea"/>
-                <a:cs typeface="+mn-cs"/>
-              </a:rPr>
-              <a:t> methods. </a:t>
-            </a:r>
-            <a:r>
-              <a:rPr lang="en-US" sz="1200" kern="1200" dirty="0" smtClean="0">
-                <a:solidFill>
-                  <a:schemeClr val="tx1"/>
-                </a:solidFill>
-                <a:effectLst/>
-                <a:latin typeface="+mn-lt"/>
-                <a:ea typeface="+mn-ea"/>
-                <a:cs typeface="+mn-cs"/>
-              </a:rPr>
-              <a:t>These decompose the path integral into parts that can be approximated by optimization, allowing us to return to the world of</a:t>
+              <a:t>back propagation. These techniques originate with Boltzmann and the field of statistical</a:t>
             </a:r>
             <a:r>
               <a:rPr lang="en-US" sz="1200" kern="1200" baseline="0" dirty="0" smtClean="0">
@@ -2004,43 +2162,7 @@
                 <a:ea typeface="+mn-ea"/>
                 <a:cs typeface="+mn-cs"/>
               </a:rPr>
-              <a:t> </a:t>
-            </a:r>
-            <a:r>
-              <a:rPr lang="en-US" sz="1200" kern="1200" dirty="0" smtClean="0">
-                <a:solidFill>
-                  <a:schemeClr val="tx1"/>
-                </a:solidFill>
-                <a:effectLst/>
-                <a:latin typeface="+mn-lt"/>
-                <a:ea typeface="+mn-ea"/>
-                <a:cs typeface="+mn-cs"/>
-              </a:rPr>
-              <a:t>back </a:t>
-            </a:r>
-            <a:r>
-              <a:rPr lang="en-US" sz="1200" kern="1200" dirty="0" smtClean="0">
-                <a:solidFill>
-                  <a:schemeClr val="tx1"/>
-                </a:solidFill>
-                <a:effectLst/>
-                <a:latin typeface="+mn-lt"/>
-                <a:ea typeface="+mn-ea"/>
-                <a:cs typeface="+mn-cs"/>
-              </a:rPr>
-              <a:t>propagation</a:t>
-            </a:r>
-            <a:r>
-              <a:rPr lang="en-US" sz="1200" kern="1200" dirty="0" smtClean="0">
-                <a:solidFill>
-                  <a:schemeClr val="tx1"/>
-                </a:solidFill>
-                <a:effectLst/>
-                <a:latin typeface="+mn-lt"/>
-                <a:ea typeface="+mn-ea"/>
-                <a:cs typeface="+mn-cs"/>
-              </a:rPr>
-              <a:t>. These techniques originate with Boltzmann and the field of statistical</a:t>
+              <a:t> mechanics: the class of techniques that was </a:t>
             </a:r>
             <a:r>
               <a:rPr lang="en-US" sz="1200" kern="1200" baseline="0" dirty="0" smtClean="0">
@@ -2052,7 +2174,19 @@
                 <a:ea typeface="+mn-ea"/>
                 <a:cs typeface="+mn-cs"/>
               </a:rPr>
-              <a:t> mechanics: the class of techniques that was derived to give us our theoretical understanding of heat.</a:t>
+              <a:t>derived </a:t>
+            </a:r>
+            <a:r>
+              <a:rPr lang="en-US" sz="1200" kern="1200" baseline="0" dirty="0" smtClean="0">
+                <a:solidFill>
+                  <a:schemeClr val="tx1"/>
+                </a:solidFill>
+                <a:effectLst/>
+                <a:latin typeface="+mn-lt"/>
+                <a:ea typeface="+mn-ea"/>
+                <a:cs typeface="+mn-cs"/>
+              </a:rPr>
+              <a:t>give us our theoretical understanding of heat.</a:t>
             </a:r>
           </a:p>
           <a:p>
@@ -2126,7 +2260,79 @@
                 <a:ea typeface="+mn-ea"/>
                 <a:cs typeface="+mn-cs"/>
               </a:rPr>
-              <a:t> do have implementations of these systems today, and they are much more data efficient than the neural networks of the 1990s. The challenge is scaling the systems up so that they can take advantage of the data on the scale that the deep neural networks do.</a:t>
+              <a:t> do have implementations of these systems today, and they are much more data efficient </a:t>
+            </a:r>
+            <a:r>
+              <a:rPr lang="en-US" sz="1200" kern="1200" baseline="0" dirty="0" smtClean="0">
+                <a:solidFill>
+                  <a:schemeClr val="tx1"/>
+                </a:solidFill>
+                <a:effectLst/>
+                <a:latin typeface="+mn-lt"/>
+                <a:ea typeface="+mn-ea"/>
+                <a:cs typeface="+mn-cs"/>
+              </a:rPr>
+              <a:t>than </a:t>
+            </a:r>
+            <a:r>
+              <a:rPr lang="en-US" sz="1200" kern="1200" baseline="0" dirty="0" smtClean="0">
+                <a:solidFill>
+                  <a:schemeClr val="tx1"/>
+                </a:solidFill>
+                <a:effectLst/>
+                <a:latin typeface="+mn-lt"/>
+                <a:ea typeface="+mn-ea"/>
+                <a:cs typeface="+mn-cs"/>
+              </a:rPr>
+              <a:t>neural networks </a:t>
+            </a:r>
+            <a:r>
+              <a:rPr lang="en-US" sz="1200" kern="1200" baseline="0" dirty="0" smtClean="0">
+                <a:solidFill>
+                  <a:schemeClr val="tx1"/>
+                </a:solidFill>
+                <a:effectLst/>
+                <a:latin typeface="+mn-lt"/>
+                <a:ea typeface="+mn-ea"/>
+                <a:cs typeface="+mn-cs"/>
+              </a:rPr>
+              <a:t>trained by back propagation. </a:t>
+            </a:r>
+            <a:r>
+              <a:rPr lang="en-US" sz="1200" kern="1200" baseline="0" dirty="0" smtClean="0">
+                <a:solidFill>
+                  <a:schemeClr val="tx1"/>
+                </a:solidFill>
+                <a:effectLst/>
+                <a:latin typeface="+mn-lt"/>
+                <a:ea typeface="+mn-ea"/>
+                <a:cs typeface="+mn-cs"/>
+              </a:rPr>
+              <a:t>The challenge is scaling the </a:t>
+            </a:r>
+            <a:r>
+              <a:rPr lang="en-US" sz="1200" kern="1200" baseline="0" dirty="0" smtClean="0">
+                <a:solidFill>
+                  <a:schemeClr val="tx1"/>
+                </a:solidFill>
+                <a:effectLst/>
+                <a:latin typeface="+mn-lt"/>
+                <a:ea typeface="+mn-ea"/>
+                <a:cs typeface="+mn-cs"/>
+              </a:rPr>
+              <a:t>implementations up </a:t>
+            </a:r>
+            <a:r>
+              <a:rPr lang="en-US" sz="1200" kern="1200" baseline="0" dirty="0" smtClean="0">
+                <a:solidFill>
+                  <a:schemeClr val="tx1"/>
+                </a:solidFill>
+                <a:effectLst/>
+                <a:latin typeface="+mn-lt"/>
+                <a:ea typeface="+mn-ea"/>
+                <a:cs typeface="+mn-cs"/>
+              </a:rPr>
+              <a:t>so that they can take advantage of the data on the scale that the deep neural networks do.</a:t>
             </a:r>
           </a:p>
           <a:p>
@@ -2176,10 +2382,56 @@
                 <a:ea typeface="+mn-ea"/>
                 <a:cs typeface="+mn-cs"/>
               </a:rPr>
-              <a:t>We can easily become deluded about our capabilities due to the vast amounts of data we are handling. The intelligent systems we can develop can be super-human in many ways, but one area where we are consistently underperforming is in the data efficiency. If this is not addressed from a methodological stand point then it will severely restring the classes of problems in which we can implement these methods.</a:t>
-            </a:r>
-          </a:p>
-          <a:p>
+              <a:t>We can easily become deluded about our capabilities due to the vast amounts of data we are handling. The intelligent systems </a:t>
+            </a:r>
+            <a:r>
+              <a:rPr lang="en-US" sz="1200" kern="1200" baseline="0" dirty="0" smtClean="0">
+                <a:solidFill>
+                  <a:schemeClr val="tx1"/>
+                </a:solidFill>
+                <a:effectLst/>
+                <a:latin typeface="+mn-lt"/>
+                <a:ea typeface="+mn-ea"/>
+                <a:cs typeface="+mn-cs"/>
+              </a:rPr>
+              <a:t>we </a:t>
+            </a:r>
+            <a:r>
+              <a:rPr lang="en-US" sz="1200" kern="1200" baseline="0" dirty="0" smtClean="0">
+                <a:solidFill>
+                  <a:schemeClr val="tx1"/>
+                </a:solidFill>
+                <a:effectLst/>
+                <a:latin typeface="+mn-lt"/>
+                <a:ea typeface="+mn-ea"/>
+                <a:cs typeface="+mn-cs"/>
+              </a:rPr>
+              <a:t>develop can be super-human in many ways, but one area where we are consistently underperforming is in the data efficiency. If this is not addressed from a methodological stand point then it will severely restring the classes of problems in which we can implement these </a:t>
+            </a:r>
+            <a:r>
+              <a:rPr lang="en-US" sz="1200" kern="1200" baseline="0" smtClean="0">
+                <a:solidFill>
+                  <a:schemeClr val="tx1"/>
+                </a:solidFill>
+                <a:effectLst/>
+                <a:latin typeface="+mn-lt"/>
+                <a:ea typeface="+mn-ea"/>
+                <a:cs typeface="+mn-cs"/>
+              </a:rPr>
+              <a:t>methods</a:t>
+            </a:r>
+            <a:r>
+              <a:rPr lang="en-US" sz="1200" kern="1200" baseline="0" smtClean="0">
+                <a:solidFill>
+                  <a:schemeClr val="tx1"/>
+                </a:solidFill>
+                <a:effectLst/>
+                <a:latin typeface="+mn-lt"/>
+                <a:ea typeface="+mn-ea"/>
+                <a:cs typeface="+mn-cs"/>
+              </a:rPr>
+              <a:t>.</a:t>
+            </a:r>
             <a:endParaRPr lang="en-US" sz="1200" kern="1200" baseline="0" dirty="0" smtClean="0">
               <a:solidFill>
                 <a:schemeClr val="tx1"/>
@@ -2189,21 +2441,6 @@
               <a:ea typeface="+mn-ea"/>
               <a:cs typeface="+mn-cs"/>
             </a:endParaRPr>
-          </a:p>
-          <a:p>
-            <a:r>
-              <a:rPr lang="en-US" sz="1200" kern="1200" baseline="0" dirty="0" smtClean="0">
-                <a:solidFill>
-                  <a:schemeClr val="tx1"/>
-                </a:solidFill>
-                <a:effectLst/>
-                <a:latin typeface="+mn-lt"/>
-                <a:ea typeface="+mn-ea"/>
-                <a:cs typeface="+mn-cs"/>
-              </a:rPr>
-              <a:t>Probability provides the answer, but implementation at scale remains an outstanding problem.</a:t>
-            </a:r>
-            <a:endParaRPr lang="en-GB" dirty="0"/>
           </a:p>
         </p:txBody>
       </p:sp>
@@ -2297,7 +2534,31 @@
                 <a:ea typeface="+mn-ea"/>
                 <a:cs typeface="+mn-cs"/>
               </a:rPr>
-              <a:t>Our AI advances, our super human performances in so many domains is being</a:t>
+              <a:t>Our AI advances, our super human performances in so many domains </a:t>
+            </a:r>
+            <a:r>
+              <a:rPr lang="en-US" sz="1200" kern="1200" dirty="0" smtClean="0">
+                <a:solidFill>
+                  <a:schemeClr val="tx1"/>
+                </a:solidFill>
+                <a:effectLst/>
+                <a:latin typeface="+mn-lt"/>
+                <a:ea typeface="+mn-ea"/>
+                <a:cs typeface="+mn-cs"/>
+              </a:rPr>
+              <a:t>are </a:t>
+            </a:r>
+            <a:r>
+              <a:rPr lang="en-US" sz="1200" kern="1200" dirty="0" smtClean="0">
+                <a:solidFill>
+                  <a:schemeClr val="tx1"/>
+                </a:solidFill>
+                <a:effectLst/>
+                <a:latin typeface="+mn-lt"/>
+                <a:ea typeface="+mn-ea"/>
+                <a:cs typeface="+mn-cs"/>
+              </a:rPr>
+              <a:t>being</a:t>
             </a:r>
             <a:r>
               <a:rPr lang="en-US" sz="1200" kern="1200" baseline="0" dirty="0" smtClean="0">
@@ -2309,7 +2570,31 @@
                 <a:ea typeface="+mn-ea"/>
                 <a:cs typeface="+mn-cs"/>
               </a:rPr>
-              <a:t> driven by machine learning. It’s being driven by data. An unearthly amount of data. Or certainly an amount of data that was unearthly in 1986 as this diagram from a 2011 Science paper shows. </a:t>
+              <a:t> driven by machine learning. </a:t>
+            </a:r>
+            <a:r>
+              <a:rPr lang="en-US" sz="1200" kern="1200" baseline="0" dirty="0" smtClean="0">
+                <a:solidFill>
+                  <a:schemeClr val="tx1"/>
+                </a:solidFill>
+                <a:effectLst/>
+                <a:latin typeface="+mn-lt"/>
+                <a:ea typeface="+mn-ea"/>
+                <a:cs typeface="+mn-cs"/>
+              </a:rPr>
+              <a:t>And machine learning is </a:t>
+            </a:r>
+            <a:r>
+              <a:rPr lang="en-US" sz="1200" kern="1200" baseline="0" dirty="0" smtClean="0">
+                <a:solidFill>
+                  <a:schemeClr val="tx1"/>
+                </a:solidFill>
+                <a:effectLst/>
+                <a:latin typeface="+mn-lt"/>
+                <a:ea typeface="+mn-ea"/>
+                <a:cs typeface="+mn-cs"/>
+              </a:rPr>
+              <a:t>being driven by data. An unearthly amount of data. Or certainly an amount of data that was unearthly in 1986 as this diagram from a 2011 Science paper shows. </a:t>
             </a:r>
           </a:p>
           <a:p>
@@ -2334,7 +2619,43 @@
                 <a:ea typeface="+mn-ea"/>
                 <a:cs typeface="+mn-cs"/>
               </a:rPr>
-              <a:t> Our vision systems see way more labeled images than we require to recognize objects, our speech systems require many more words than we do to understand comprehend</a:t>
+              <a:t> Our vision systems see </a:t>
+            </a:r>
+            <a:r>
+              <a:rPr lang="en-US" sz="1200" kern="1200" dirty="0" smtClean="0">
+                <a:solidFill>
+                  <a:schemeClr val="tx1"/>
+                </a:solidFill>
+                <a:effectLst/>
+                <a:latin typeface="+mn-lt"/>
+                <a:ea typeface="+mn-ea"/>
+                <a:cs typeface="+mn-cs"/>
+              </a:rPr>
+              <a:t>far </a:t>
+            </a:r>
+            <a:r>
+              <a:rPr lang="en-US" sz="1200" kern="1200" dirty="0" smtClean="0">
+                <a:solidFill>
+                  <a:schemeClr val="tx1"/>
+                </a:solidFill>
+                <a:effectLst/>
+                <a:latin typeface="+mn-lt"/>
+                <a:ea typeface="+mn-ea"/>
+                <a:cs typeface="+mn-cs"/>
+              </a:rPr>
+              <a:t>more labeled images than we require to recognize objects, our speech systems require many more words than we do to </a:t>
+            </a:r>
+            <a:r>
+              <a:rPr lang="en-US" sz="1200" kern="1200" dirty="0" smtClean="0">
+                <a:solidFill>
+                  <a:schemeClr val="tx1"/>
+                </a:solidFill>
+                <a:effectLst/>
+                <a:latin typeface="+mn-lt"/>
+                <a:ea typeface="+mn-ea"/>
+                <a:cs typeface="+mn-cs"/>
+              </a:rPr>
+              <a:t>comprehend</a:t>
             </a:r>
             <a:r>
               <a:rPr lang="en-US" sz="1200" kern="1200" baseline="0" dirty="0" smtClean="0">
@@ -2346,7 +2667,19 @@
                 <a:ea typeface="+mn-ea"/>
                 <a:cs typeface="+mn-cs"/>
               </a:rPr>
-              <a:t> what’s being said</a:t>
+              <a:t> </a:t>
+            </a:r>
+            <a:r>
+              <a:rPr lang="en-US" sz="1200" kern="1200" baseline="0" dirty="0" smtClean="0">
+                <a:solidFill>
+                  <a:schemeClr val="tx1"/>
+                </a:solidFill>
+                <a:effectLst/>
+                <a:latin typeface="+mn-lt"/>
+                <a:ea typeface="+mn-ea"/>
+                <a:cs typeface="+mn-cs"/>
+              </a:rPr>
+              <a:t>what’s being said</a:t>
             </a:r>
             <a:r>
               <a:rPr lang="en-US" sz="1200" kern="1200" dirty="0" smtClean="0">
@@ -2384,31 +2717,7 @@
                 <a:ea typeface="+mn-ea"/>
                 <a:cs typeface="+mn-cs"/>
               </a:rPr>
-              <a:t>So </a:t>
-            </a:r>
-            <a:r>
-              <a:rPr lang="en-US" sz="1200" kern="1200" dirty="0" smtClean="0">
-                <a:solidFill>
-                  <a:schemeClr val="tx1"/>
-                </a:solidFill>
-                <a:effectLst/>
-                <a:latin typeface="+mn-lt"/>
-                <a:ea typeface="+mn-ea"/>
-                <a:cs typeface="+mn-cs"/>
-              </a:rPr>
-              <a:t>while we are making considerable progress on tasks which were once thought extremely difficult or impossible, the truth is that the progress is driven far more by the availability of data than an improvement in algorithms</a:t>
-            </a:r>
-            <a:r>
-              <a:rPr lang="en-US" sz="1200" kern="1200" dirty="0" smtClean="0">
-                <a:solidFill>
-                  <a:schemeClr val="tx1"/>
-                </a:solidFill>
-                <a:effectLst/>
-                <a:latin typeface="+mn-lt"/>
-                <a:ea typeface="+mn-ea"/>
-                <a:cs typeface="+mn-cs"/>
-              </a:rPr>
-              <a:t>.</a:t>
+              <a:t>So while we are making considerable progress on tasks which were once thought extremely difficult or impossible, the truth is that the progress is driven far more by the availability of data than an improvement in algorithms.</a:t>
             </a:r>
           </a:p>
           <a:p>
@@ -2445,7 +2754,31 @@
                 <a:ea typeface="+mn-ea"/>
                 <a:cs typeface="+mn-cs"/>
               </a:rPr>
-              <a:t> a very real sense the methodologies we are deploying haven’t changed a great deal since the mid 1990s, what has changed is illustrated in this funnel plot. The wide availability of data. </a:t>
+              <a:t> a very real sense the methodologies we are deploying haven’t changed a great deal since the mid 1990s, what has changed is illustrated in this funnel </a:t>
+            </a:r>
+            <a:r>
+              <a:rPr lang="en-US" sz="1200" kern="1200" baseline="0" dirty="0" smtClean="0">
+                <a:solidFill>
+                  <a:schemeClr val="tx1"/>
+                </a:solidFill>
+                <a:effectLst/>
+                <a:latin typeface="+mn-lt"/>
+                <a:ea typeface="+mn-ea"/>
+                <a:cs typeface="+mn-cs"/>
+              </a:rPr>
+              <a:t>shaped plot</a:t>
+            </a:r>
+            <a:r>
+              <a:rPr lang="en-US" sz="1200" kern="1200" baseline="0" dirty="0" smtClean="0">
+                <a:solidFill>
+                  <a:schemeClr val="tx1"/>
+                </a:solidFill>
+                <a:effectLst/>
+                <a:latin typeface="+mn-lt"/>
+                <a:ea typeface="+mn-ea"/>
+                <a:cs typeface="+mn-cs"/>
+              </a:rPr>
+              <a:t>. The wide availability of data. </a:t>
             </a:r>
             <a:r>
               <a:rPr lang="en-US" sz="1200" kern="1200" dirty="0" smtClean="0">
@@ -2457,31 +2790,7 @@
                 <a:ea typeface="+mn-ea"/>
                 <a:cs typeface="+mn-cs"/>
               </a:rPr>
-              <a:t>It </a:t>
-            </a:r>
-            <a:r>
-              <a:rPr lang="en-US" sz="1200" kern="1200" dirty="0" smtClean="0">
-                <a:solidFill>
-                  <a:schemeClr val="tx1"/>
-                </a:solidFill>
-                <a:effectLst/>
-                <a:latin typeface="+mn-lt"/>
-                <a:ea typeface="+mn-ea"/>
-                <a:cs typeface="+mn-cs"/>
-              </a:rPr>
-              <a:t>is the explosion of data that has rendered </a:t>
-            </a:r>
-            <a:r>
-              <a:rPr lang="en-US" sz="1200" kern="1200" dirty="0" smtClean="0">
-                <a:solidFill>
-                  <a:schemeClr val="tx1"/>
-                </a:solidFill>
-                <a:effectLst/>
-                <a:latin typeface="+mn-lt"/>
-                <a:ea typeface="+mn-ea"/>
-                <a:cs typeface="+mn-cs"/>
-              </a:rPr>
-              <a:t>these</a:t>
+              <a:t>It is the explosion of data that has rendered these</a:t>
             </a:r>
             <a:r>
               <a:rPr lang="en-US" sz="1200" kern="1200" baseline="0" dirty="0" smtClean="0">
@@ -2682,25 +2991,25 @@
                 <a:ea typeface="Cambria" panose="02040503050406030204" pitchFamily="18" charset="0"/>
                 <a:cs typeface="Times New Roman" panose="02020603050405020304" pitchFamily="18" charset="0"/>
               </a:rPr>
-              <a:t>The current situation with data, reminds me very much of the </a:t>
-            </a:r>
-            <a:r>
-              <a:rPr lang="en-US" sz="1200" dirty="0" smtClean="0">
+              <a:t>The current situation with data, reminds me very much of the early stage of the industrial revolution. Thomas </a:t>
+            </a:r>
+            <a:r>
+              <a:rPr lang="en-US" sz="1200" dirty="0" err="1" smtClean="0">
                 <a:effectLst/>
                 <a:latin typeface="Cambria" panose="02040503050406030204" pitchFamily="18" charset="0"/>
                 <a:ea typeface="Cambria" panose="02040503050406030204" pitchFamily="18" charset="0"/>
                 <a:cs typeface="Times New Roman" panose="02020603050405020304" pitchFamily="18" charset="0"/>
               </a:rPr>
-              <a:t>early stage of the industrial revolution. Thomas </a:t>
-            </a:r>
-            <a:r>
-              <a:rPr lang="en-US" sz="1200" dirty="0" err="1" smtClean="0">
+              <a:t>Newcomen</a:t>
+            </a:r>
+            <a:r>
+              <a:rPr lang="en-US" sz="1200" dirty="0" smtClean="0">
                 <a:effectLst/>
                 <a:latin typeface="Cambria" panose="02040503050406030204" pitchFamily="18" charset="0"/>
                 <a:ea typeface="Cambria" panose="02040503050406030204" pitchFamily="18" charset="0"/>
                 <a:cs typeface="Times New Roman" panose="02020603050405020304" pitchFamily="18" charset="0"/>
               </a:rPr>
-              <a:t>Newcomen</a:t>
+              <a:t> was born in the South West of England, an area well known, since Roman times, for tin mining. As tin was extracted and mines became </a:t>
             </a:r>
             <a:r>
               <a:rPr lang="en-US" sz="1200" dirty="0" smtClean="0">
@@ -2709,61 +3018,61 @@
                 <a:ea typeface="Cambria" panose="02040503050406030204" pitchFamily="18" charset="0"/>
                 <a:cs typeface="Times New Roman" panose="02020603050405020304" pitchFamily="18" charset="0"/>
               </a:rPr>
-              <a:t> was born in the South West of England, an area well known, since Roman times, for tin mining. </a:t>
-            </a:r>
-            <a:r>
-              <a:rPr lang="en-US" sz="1200" dirty="0" smtClean="0">
+              <a:t>deeper.</a:t>
+            </a:r>
+            <a:r>
+              <a:rPr lang="en-US" sz="1200" baseline="0" dirty="0" smtClean="0">
                 <a:effectLst/>
                 <a:latin typeface="Cambria" panose="02040503050406030204" pitchFamily="18" charset="0"/>
                 <a:ea typeface="Cambria" panose="02040503050406030204" pitchFamily="18" charset="0"/>
                 <a:cs typeface="Times New Roman" panose="02020603050405020304" pitchFamily="18" charset="0"/>
               </a:rPr>
-              <a:t>As tin was extracted and mines became deeper, they needed to be pumped out of the ground water that seeped in.</a:t>
-            </a:r>
-            <a:r>
-              <a:rPr lang="en-US" sz="1200" baseline="0" dirty="0" smtClean="0">
+              <a:t> Ground water that pumped into the mines needed to be pumped out</a:t>
+            </a:r>
+            <a:r>
+              <a:rPr lang="en-US" sz="1200" dirty="0" smtClean="0">
                 <a:effectLst/>
                 <a:latin typeface="Cambria" panose="02040503050406030204" pitchFamily="18" charset="0"/>
                 <a:ea typeface="Cambria" panose="02040503050406030204" pitchFamily="18" charset="0"/>
                 <a:cs typeface="Times New Roman" panose="02020603050405020304" pitchFamily="18" charset="0"/>
               </a:rPr>
-              <a:t> I</a:t>
-            </a:r>
-            <a:r>
-              <a:rPr lang="en-US" sz="1200" dirty="0" smtClean="0">
+              <a:t>.</a:t>
+            </a:r>
+            <a:r>
+              <a:rPr lang="en-US" sz="1200" baseline="0" dirty="0" smtClean="0">
                 <a:effectLst/>
                 <a:latin typeface="Cambria" panose="02040503050406030204" pitchFamily="18" charset="0"/>
                 <a:ea typeface="Cambria" panose="02040503050406030204" pitchFamily="18" charset="0"/>
                 <a:cs typeface="Times New Roman" panose="02020603050405020304" pitchFamily="18" charset="0"/>
               </a:rPr>
-              <a:t>n </a:t>
-            </a:r>
-            <a:r>
-              <a:rPr lang="en-US" sz="1200" dirty="0" smtClean="0">
+              <a:t> </a:t>
+            </a:r>
+            <a:r>
+              <a:rPr lang="en-US" sz="1200" baseline="0" dirty="0" smtClean="0">
                 <a:effectLst/>
                 <a:latin typeface="Cambria" panose="02040503050406030204" pitchFamily="18" charset="0"/>
                 <a:ea typeface="Cambria" panose="02040503050406030204" pitchFamily="18" charset="0"/>
                 <a:cs typeface="Times New Roman" panose="02020603050405020304" pitchFamily="18" charset="0"/>
               </a:rPr>
-              <a:t>1712 </a:t>
-            </a:r>
-            <a:r>
-              <a:rPr lang="en-US" sz="1200" dirty="0" err="1" smtClean="0">
+              <a:t>I</a:t>
+            </a:r>
+            <a:r>
+              <a:rPr lang="en-US" sz="1200" dirty="0" smtClean="0">
                 <a:effectLst/>
                 <a:latin typeface="Cambria" panose="02040503050406030204" pitchFamily="18" charset="0"/>
                 <a:ea typeface="Cambria" panose="02040503050406030204" pitchFamily="18" charset="0"/>
                 <a:cs typeface="Times New Roman" panose="02020603050405020304" pitchFamily="18" charset="0"/>
               </a:rPr>
-              <a:t>Newcomen</a:t>
-            </a:r>
-            <a:r>
-              <a:rPr lang="en-US" sz="1200" dirty="0" smtClean="0">
+              <a:t>n 1712 </a:t>
+            </a:r>
+            <a:r>
+              <a:rPr lang="en-US" sz="1200" dirty="0" err="1" smtClean="0">
                 <a:effectLst/>
                 <a:latin typeface="Cambria" panose="02040503050406030204" pitchFamily="18" charset="0"/>
                 <a:ea typeface="Cambria" panose="02040503050406030204" pitchFamily="18" charset="0"/>
                 <a:cs typeface="Times New Roman" panose="02020603050405020304" pitchFamily="18" charset="0"/>
               </a:rPr>
-              <a:t> invented </a:t>
+              <a:t>Newcomen</a:t>
             </a:r>
             <a:r>
               <a:rPr lang="en-US" sz="1200" dirty="0" smtClean="0">
@@ -2772,41 +3081,8 @@
                 <a:ea typeface="Cambria" panose="02040503050406030204" pitchFamily="18" charset="0"/>
                 <a:cs typeface="Times New Roman" panose="02020603050405020304" pitchFamily="18" charset="0"/>
               </a:rPr>
-              <a:t>a </a:t>
-            </a:r>
-            <a:r>
-              <a:rPr lang="en-US" sz="1200" dirty="0" smtClean="0">
-                <a:effectLst/>
-                <a:latin typeface="Cambria" panose="02040503050406030204" pitchFamily="18" charset="0"/>
-                <a:ea typeface="Cambria" panose="02040503050406030204" pitchFamily="18" charset="0"/>
-                <a:cs typeface="Times New Roman" panose="02020603050405020304" pitchFamily="18" charset="0"/>
-              </a:rPr>
-              <a:t>steam engine for </a:t>
-            </a:r>
-            <a:r>
-              <a:rPr lang="en-US" sz="1200" dirty="0" smtClean="0">
-                <a:effectLst/>
-                <a:latin typeface="Cambria" panose="02040503050406030204" pitchFamily="18" charset="0"/>
-                <a:ea typeface="Cambria" panose="02040503050406030204" pitchFamily="18" charset="0"/>
-                <a:cs typeface="Times New Roman" panose="02020603050405020304" pitchFamily="18" charset="0"/>
-              </a:rPr>
-              <a:t>doing exactly </a:t>
-            </a:r>
-            <a:r>
-              <a:rPr lang="en-US" sz="1200" dirty="0" smtClean="0">
-                <a:effectLst/>
-                <a:latin typeface="Cambria" panose="02040503050406030204" pitchFamily="18" charset="0"/>
-                <a:ea typeface="Cambria" panose="02040503050406030204" pitchFamily="18" charset="0"/>
-                <a:cs typeface="Times New Roman" panose="02020603050405020304" pitchFamily="18" charset="0"/>
-              </a:rPr>
-              <a:t>that. </a:t>
-            </a:r>
-            <a:endParaRPr lang="en-US" sz="1200" dirty="0" smtClean="0">
-              <a:effectLst/>
-              <a:latin typeface="Cambria" panose="02040503050406030204" pitchFamily="18" charset="0"/>
-              <a:ea typeface="Cambria" panose="02040503050406030204" pitchFamily="18" charset="0"/>
-              <a:cs typeface="Times New Roman" panose="02020603050405020304" pitchFamily="18" charset="0"/>
-            </a:endParaRPr>
+              <a:t> invented a steam engine for doing exactly that. </a:t>
+            </a:r>
           </a:p>
           <a:p>
             <a:pPr marL="0" marR="0" indent="0" algn="l" defTabSz="914400" rtl="0" eaLnBrk="1" fontAlgn="auto" latinLnBrk="0" hangingPunct="1">
@@ -2911,16 +3187,16 @@
                 <a:ea typeface="Cambria" panose="02040503050406030204" pitchFamily="18" charset="0"/>
                 <a:cs typeface="Times New Roman" panose="02020603050405020304" pitchFamily="18" charset="0"/>
               </a:rPr>
-              <a:t>His </a:t>
-            </a:r>
-            <a:r>
-              <a:rPr lang="en-US" sz="1200" dirty="0" smtClean="0">
+              <a:t>His engine consisted of a large piston sitting on top of a boiler. The piston chamber was alternatively filled with steam by the boiler, causing the piston to rise</a:t>
+            </a:r>
+            <a:r>
+              <a:rPr lang="en-US" sz="1200" baseline="0" dirty="0" smtClean="0">
                 <a:effectLst/>
                 <a:latin typeface="Cambria" panose="02040503050406030204" pitchFamily="18" charset="0"/>
                 <a:ea typeface="Cambria" panose="02040503050406030204" pitchFamily="18" charset="0"/>
                 <a:cs typeface="Times New Roman" panose="02020603050405020304" pitchFamily="18" charset="0"/>
               </a:rPr>
-              <a:t>engine consisted of a large piston sitting on top of a boiler. The piston </a:t>
+              <a:t>,</a:t>
             </a:r>
             <a:r>
               <a:rPr lang="en-US" sz="1200" dirty="0" smtClean="0">
@@ -2929,61 +3205,7 @@
                 <a:ea typeface="Cambria" panose="02040503050406030204" pitchFamily="18" charset="0"/>
                 <a:cs typeface="Times New Roman" panose="02020603050405020304" pitchFamily="18" charset="0"/>
               </a:rPr>
-              <a:t>chamber was </a:t>
-            </a:r>
-            <a:r>
-              <a:rPr lang="en-US" sz="1200" dirty="0" smtClean="0">
-                <a:effectLst/>
-                <a:latin typeface="Cambria" panose="02040503050406030204" pitchFamily="18" charset="0"/>
-                <a:ea typeface="Cambria" panose="02040503050406030204" pitchFamily="18" charset="0"/>
-                <a:cs typeface="Times New Roman" panose="02020603050405020304" pitchFamily="18" charset="0"/>
-              </a:rPr>
-              <a:t>alternatively filled with steam by the boiler</a:t>
-            </a:r>
-            <a:r>
-              <a:rPr lang="en-US" sz="1200" dirty="0" smtClean="0">
-                <a:effectLst/>
-                <a:latin typeface="Cambria" panose="02040503050406030204" pitchFamily="18" charset="0"/>
-                <a:ea typeface="Cambria" panose="02040503050406030204" pitchFamily="18" charset="0"/>
-                <a:cs typeface="Times New Roman" panose="02020603050405020304" pitchFamily="18" charset="0"/>
-              </a:rPr>
-              <a:t>, causing the piston to rise</a:t>
-            </a:r>
-            <a:r>
-              <a:rPr lang="en-US" sz="1200" baseline="0" dirty="0" smtClean="0">
-                <a:effectLst/>
-                <a:latin typeface="Cambria" panose="02040503050406030204" pitchFamily="18" charset="0"/>
-                <a:ea typeface="Cambria" panose="02040503050406030204" pitchFamily="18" charset="0"/>
-                <a:cs typeface="Times New Roman" panose="02020603050405020304" pitchFamily="18" charset="0"/>
-              </a:rPr>
-              <a:t>,</a:t>
-            </a:r>
-            <a:r>
-              <a:rPr lang="en-US" sz="1200" dirty="0" smtClean="0">
-                <a:effectLst/>
-                <a:latin typeface="Cambria" panose="02040503050406030204" pitchFamily="18" charset="0"/>
-                <a:ea typeface="Cambria" panose="02040503050406030204" pitchFamily="18" charset="0"/>
-                <a:cs typeface="Times New Roman" panose="02020603050405020304" pitchFamily="18" charset="0"/>
-              </a:rPr>
-              <a:t> </a:t>
-            </a:r>
-            <a:r>
-              <a:rPr lang="en-US" sz="1200" dirty="0" smtClean="0">
-                <a:effectLst/>
-                <a:latin typeface="Cambria" panose="02040503050406030204" pitchFamily="18" charset="0"/>
-                <a:ea typeface="Cambria" panose="02040503050406030204" pitchFamily="18" charset="0"/>
-                <a:cs typeface="Times New Roman" panose="02020603050405020304" pitchFamily="18" charset="0"/>
-              </a:rPr>
-              <a:t>and then cooled through direct injection of </a:t>
-            </a:r>
-            <a:r>
-              <a:rPr lang="en-US" sz="1200" dirty="0" smtClean="0">
-                <a:effectLst/>
-                <a:latin typeface="Cambria" panose="02040503050406030204" pitchFamily="18" charset="0"/>
-                <a:ea typeface="Cambria" panose="02040503050406030204" pitchFamily="18" charset="0"/>
-                <a:cs typeface="Times New Roman" panose="02020603050405020304" pitchFamily="18" charset="0"/>
-              </a:rPr>
-              <a:t>water, causing the</a:t>
+              <a:t> and then cooled through direct injection of water, causing the</a:t>
             </a:r>
             <a:r>
               <a:rPr lang="en-US" sz="1200" baseline="0" dirty="0" smtClean="0">
@@ -3081,7 +3303,25 @@
                 <a:ea typeface="Cambria" panose="02040503050406030204" pitchFamily="18" charset="0"/>
                 <a:cs typeface="Times New Roman" panose="02020603050405020304" pitchFamily="18" charset="0"/>
               </a:rPr>
-              <a:t> so inefficient, that it was impractical. It needed too much coal.</a:t>
+              <a:t> so inefficient, that it was impractical. It needed </a:t>
+            </a:r>
+            <a:r>
+              <a:rPr lang="en-US" sz="1200" dirty="0" smtClean="0">
+                <a:effectLst/>
+                <a:latin typeface="Cambria" panose="02040503050406030204" pitchFamily="18" charset="0"/>
+                <a:ea typeface="Cambria" panose="02040503050406030204" pitchFamily="18" charset="0"/>
+                <a:cs typeface="Times New Roman" panose="02020603050405020304" pitchFamily="18" charset="0"/>
+              </a:rPr>
+              <a:t>far too </a:t>
+            </a:r>
+            <a:r>
+              <a:rPr lang="en-US" sz="1200" dirty="0" smtClean="0">
+                <a:effectLst/>
+                <a:latin typeface="Cambria" panose="02040503050406030204" pitchFamily="18" charset="0"/>
+                <a:ea typeface="Cambria" panose="02040503050406030204" pitchFamily="18" charset="0"/>
+                <a:cs typeface="Times New Roman" panose="02020603050405020304" pitchFamily="18" charset="0"/>
+              </a:rPr>
+              <a:t>much coal.</a:t>
             </a:r>
             <a:endParaRPr lang="en-GB" sz="1200" dirty="0" smtClean="0">
               <a:effectLst/>
@@ -3190,16 +3430,16 @@
                 <a:ea typeface="Cambria" panose="02040503050406030204" pitchFamily="18" charset="0"/>
                 <a:cs typeface="Times New Roman" panose="02020603050405020304" pitchFamily="18" charset="0"/>
               </a:rPr>
-              <a:t>They were,</a:t>
-            </a:r>
-            <a:r>
-              <a:rPr lang="en-US" sz="1200" baseline="0" dirty="0" smtClean="0">
+              <a:t>These are the coal fields of the UK in the 19</a:t>
+            </a:r>
+            <a:r>
+              <a:rPr lang="en-US" sz="1200" baseline="30000" dirty="0" smtClean="0">
                 <a:effectLst/>
                 <a:latin typeface="Cambria" panose="02040503050406030204" pitchFamily="18" charset="0"/>
                 <a:ea typeface="Cambria" panose="02040503050406030204" pitchFamily="18" charset="0"/>
                 <a:cs typeface="Times New Roman" panose="02020603050405020304" pitchFamily="18" charset="0"/>
               </a:rPr>
-              <a:t> however, </a:t>
+              <a:t>th</a:t>
             </a:r>
             <a:r>
               <a:rPr lang="en-US" sz="1200" dirty="0" smtClean="0">
@@ -3208,16 +3448,69 @@
                 <a:ea typeface="Cambria" panose="02040503050406030204" pitchFamily="18" charset="0"/>
                 <a:cs typeface="Times New Roman" panose="02020603050405020304" pitchFamily="18" charset="0"/>
               </a:rPr>
-              <a:t>widely </a:t>
-            </a:r>
-            <a:r>
-              <a:rPr lang="en-US" sz="1200" dirty="0" smtClean="0">
+              <a:t> century. The</a:t>
+            </a:r>
+            <a:r>
+              <a:rPr lang="en-US" sz="1200" baseline="0" dirty="0" smtClean="0">
                 <a:effectLst/>
                 <a:latin typeface="Cambria" panose="02040503050406030204" pitchFamily="18" charset="0"/>
                 <a:ea typeface="Cambria" panose="02040503050406030204" pitchFamily="18" charset="0"/>
                 <a:cs typeface="Times New Roman" panose="02020603050405020304" pitchFamily="18" charset="0"/>
               </a:rPr>
-              <a:t>used but in coalfields, where they could be easily fueled.</a:t>
+              <a:t> tin mines of Cornwall do not appear on the map.</a:t>
+            </a:r>
+          </a:p>
+          <a:p>
+            <a:pPr>
+              <a:spcBef>
+                <a:spcPts val="900"/>
+              </a:spcBef>
+              <a:spcAft>
+                <a:spcPts val="900"/>
+              </a:spcAft>
+            </a:pPr>
+            <a:endParaRPr lang="en-US" sz="1200" baseline="0" dirty="0" smtClean="0">
+              <a:effectLst/>
+              <a:latin typeface="Cambria" panose="02040503050406030204" pitchFamily="18" charset="0"/>
+              <a:ea typeface="Cambria" panose="02040503050406030204" pitchFamily="18" charset="0"/>
+              <a:cs typeface="Times New Roman" panose="02020603050405020304" pitchFamily="18" charset="0"/>
+            </a:endParaRPr>
+          </a:p>
+          <a:p>
+            <a:pPr>
+              <a:spcBef>
+                <a:spcPts val="900"/>
+              </a:spcBef>
+              <a:spcAft>
+                <a:spcPts val="900"/>
+              </a:spcAft>
+            </a:pPr>
+            <a:r>
+              <a:rPr lang="en-US" sz="1200" baseline="0" dirty="0" smtClean="0">
+                <a:effectLst/>
+                <a:latin typeface="Cambria" panose="02040503050406030204" pitchFamily="18" charset="0"/>
+                <a:ea typeface="Cambria" panose="02040503050406030204" pitchFamily="18" charset="0"/>
+                <a:cs typeface="Times New Roman" panose="02020603050405020304" pitchFamily="18" charset="0"/>
+              </a:rPr>
+              <a:t>However, </a:t>
+            </a:r>
+            <a:r>
+              <a:rPr lang="en-US" sz="1200" baseline="0" dirty="0" err="1" smtClean="0">
+                <a:effectLst/>
+                <a:latin typeface="Cambria" panose="02040503050406030204" pitchFamily="18" charset="0"/>
+                <a:ea typeface="Cambria" panose="02040503050406030204" pitchFamily="18" charset="0"/>
+                <a:cs typeface="Times New Roman" panose="02020603050405020304" pitchFamily="18" charset="0"/>
+              </a:rPr>
+              <a:t>Newcomen’s</a:t>
+            </a:r>
+            <a:r>
+              <a:rPr lang="en-US" sz="1200" baseline="0" dirty="0" smtClean="0">
+                <a:effectLst/>
+                <a:latin typeface="Cambria" panose="02040503050406030204" pitchFamily="18" charset="0"/>
+                <a:ea typeface="Cambria" panose="02040503050406030204" pitchFamily="18" charset="0"/>
+                <a:cs typeface="Times New Roman" panose="02020603050405020304" pitchFamily="18" charset="0"/>
+              </a:rPr>
+              <a:t> engine was very widely deployed at the mines associated with these coal fields. </a:t>
             </a:r>
             <a:endParaRPr lang="en-GB" sz="1200" dirty="0" smtClean="0">
               <a:effectLst/>
@@ -3258,25 +3551,7 @@
                 <a:ea typeface="Cambria" panose="02040503050406030204" pitchFamily="18" charset="0"/>
                 <a:cs typeface="Times New Roman" panose="02020603050405020304" pitchFamily="18" charset="0"/>
               </a:rPr>
-              <a:t>This </a:t>
-            </a:r>
-            <a:r>
-              <a:rPr lang="en-US" sz="1200" dirty="0" smtClean="0">
-                <a:effectLst/>
-                <a:latin typeface="Cambria" panose="02040503050406030204" pitchFamily="18" charset="0"/>
-                <a:ea typeface="Cambria" panose="02040503050406030204" pitchFamily="18" charset="0"/>
-                <a:cs typeface="Times New Roman" panose="02020603050405020304" pitchFamily="18" charset="0"/>
-              </a:rPr>
-              <a:t>brings me to mind somewhat of the situation today: the major internet companies can profit from our current generation of inference engines because they are equivalent to the coalfields of yesteryear. They have enormous quantities of data readily available</a:t>
-            </a:r>
-            <a:r>
-              <a:rPr lang="en-US" sz="1200" dirty="0" smtClean="0">
-                <a:effectLst/>
-                <a:latin typeface="Cambria" panose="02040503050406030204" pitchFamily="18" charset="0"/>
-                <a:ea typeface="Cambria" panose="02040503050406030204" pitchFamily="18" charset="0"/>
-                <a:cs typeface="Times New Roman" panose="02020603050405020304" pitchFamily="18" charset="0"/>
-              </a:rPr>
-              <a:t>. So we see a lot of interest in today’s deep learning technologies from those companies that have a lot of data. </a:t>
+              <a:t>This brings me to mind somewhat of the situation today: the major internet companies can profit from our current generation of inference engines because they are equivalent to the coalfields of yesteryear. They have enormous quantities of data readily available. So we see a lot of interest in today’s deep learning technologies from those companies that have a lot of data. </a:t>
             </a:r>
           </a:p>
           <a:p>
@@ -3412,13 +3687,13 @@
               <a:t> </a:t>
             </a:r>
             <a:r>
-              <a:rPr lang="en-US" sz="1200" baseline="0" dirty="0" err="1" smtClean="0">
+              <a:rPr lang="en-US" sz="1200" baseline="0" dirty="0" smtClean="0">
                 <a:effectLst/>
                 <a:latin typeface="Cambria" panose="02040503050406030204" pitchFamily="18" charset="0"/>
                 <a:ea typeface="Cambria" panose="02040503050406030204" pitchFamily="18" charset="0"/>
                 <a:cs typeface="Times New Roman" panose="02020603050405020304" pitchFamily="18" charset="0"/>
               </a:rPr>
-              <a:t>Centuray</a:t>
+              <a:t>Century </a:t>
             </a:r>
             <a:r>
               <a:rPr lang="en-US" sz="1200" baseline="0" dirty="0" smtClean="0">
@@ -3427,77 +3702,8 @@
                 <a:ea typeface="Cambria" panose="02040503050406030204" pitchFamily="18" charset="0"/>
                 <a:cs typeface="Times New Roman" panose="02020603050405020304" pitchFamily="18" charset="0"/>
               </a:rPr>
-              <a:t> England distribution of coal over the country was a challenge, sharing and interconnection of some data types remains a challenge. Particularly personal data where there are issues of privacy and ethics. </a:t>
-            </a:r>
-          </a:p>
-          <a:p>
-            <a:pPr>
-              <a:spcBef>
-                <a:spcPts val="900"/>
-              </a:spcBef>
-              <a:spcAft>
-                <a:spcPts val="900"/>
-              </a:spcAft>
-            </a:pPr>
-            <a:endParaRPr lang="en-US" sz="1200" baseline="0" dirty="0" smtClean="0">
-              <a:effectLst/>
-              <a:latin typeface="Cambria" panose="02040503050406030204" pitchFamily="18" charset="0"/>
-              <a:ea typeface="Cambria" panose="02040503050406030204" pitchFamily="18" charset="0"/>
-              <a:cs typeface="Times New Roman" panose="02020603050405020304" pitchFamily="18" charset="0"/>
-            </a:endParaRPr>
-          </a:p>
-          <a:p>
-            <a:pPr>
-              <a:spcBef>
-                <a:spcPts val="900"/>
-              </a:spcBef>
-              <a:spcAft>
-                <a:spcPts val="900"/>
-              </a:spcAft>
-            </a:pPr>
-            <a:r>
-              <a:rPr lang="en-US" sz="1200" baseline="0" dirty="0" smtClean="0">
-                <a:effectLst/>
-                <a:latin typeface="Cambria" panose="02040503050406030204" pitchFamily="18" charset="0"/>
-                <a:ea typeface="Cambria" panose="02040503050406030204" pitchFamily="18" charset="0"/>
-                <a:cs typeface="Times New Roman" panose="02020603050405020304" pitchFamily="18" charset="0"/>
-              </a:rPr>
-              <a:t>The Cornish Tin mines are not even on this map. In the 18</a:t>
-            </a:r>
-            <a:r>
-              <a:rPr lang="en-US" sz="1200" baseline="30000" dirty="0" smtClean="0">
-                <a:effectLst/>
-                <a:latin typeface="Cambria" panose="02040503050406030204" pitchFamily="18" charset="0"/>
-                <a:ea typeface="Cambria" panose="02040503050406030204" pitchFamily="18" charset="0"/>
-                <a:cs typeface="Times New Roman" panose="02020603050405020304" pitchFamily="18" charset="0"/>
-              </a:rPr>
-              <a:t>th</a:t>
-            </a:r>
-            <a:r>
-              <a:rPr lang="en-US" sz="1200" baseline="0" dirty="0" smtClean="0">
-                <a:effectLst/>
-                <a:latin typeface="Cambria" panose="02040503050406030204" pitchFamily="18" charset="0"/>
-                <a:ea typeface="Cambria" panose="02040503050406030204" pitchFamily="18" charset="0"/>
-                <a:cs typeface="Times New Roman" panose="02020603050405020304" pitchFamily="18" charset="0"/>
-              </a:rPr>
-              <a:t> century the distribution infrastructure was not capable of easily distributing the coal to where it was needed in the South West.</a:t>
-            </a:r>
-          </a:p>
-          <a:p>
-            <a:pPr>
-              <a:spcBef>
-                <a:spcPts val="900"/>
-              </a:spcBef>
-              <a:spcAft>
-                <a:spcPts val="900"/>
-              </a:spcAft>
-            </a:pPr>
-            <a:endParaRPr lang="en-US" sz="1200" baseline="0" dirty="0" smtClean="0">
-              <a:effectLst/>
-              <a:latin typeface="Cambria" panose="02040503050406030204" pitchFamily="18" charset="0"/>
-              <a:ea typeface="Cambria" panose="02040503050406030204" pitchFamily="18" charset="0"/>
-              <a:cs typeface="Times New Roman" panose="02020603050405020304" pitchFamily="18" charset="0"/>
-            </a:endParaRPr>
+              <a:t>England distribution of coal over the country was a challenge, sharing and interconnection of some data types remains a challenge. Particularly personal data where there are issues of privacy and ethics. </a:t>
+            </a:r>
           </a:p>
           <a:p>
             <a:endParaRPr lang="en-GB" dirty="0"/>
@@ -3649,7 +3855,7 @@
                 <a:ea typeface="Cambria" panose="02040503050406030204" pitchFamily="18" charset="0"/>
                 <a:cs typeface="Times New Roman" panose="02020603050405020304" pitchFamily="18" charset="0"/>
               </a:rPr>
-              <a:t>In </a:t>
+              <a:t>In application domains such as medicine we face challenges because firstly: the complexity of the system is much greater than speech, vision or even the game of Go. Our interventions are often at a biochemical level, and yet </a:t>
             </a:r>
             <a:r>
               <a:rPr lang="en-US" sz="1200" dirty="0" smtClean="0">
@@ -3658,7 +3864,34 @@
                 <a:ea typeface="Cambria" panose="02040503050406030204" pitchFamily="18" charset="0"/>
                 <a:cs typeface="Times New Roman" panose="02020603050405020304" pitchFamily="18" charset="0"/>
               </a:rPr>
-              <a:t>application domains such as medicine we face challenges because firstly: the complexity of the system is much greater than speech, vision or even the game of Go. Our interventions are often at a biochemical level, and yet their manifestations occur at the global level of our health.</a:t>
+              <a:t>our intent is that they manifest themselves at the level </a:t>
+            </a:r>
+            <a:r>
+              <a:rPr lang="en-US" sz="1200" dirty="0" smtClean="0">
+                <a:effectLst/>
+                <a:latin typeface="Cambria" panose="02040503050406030204" pitchFamily="18" charset="0"/>
+                <a:ea typeface="Cambria" panose="02040503050406030204" pitchFamily="18" charset="0"/>
+                <a:cs typeface="Times New Roman" panose="02020603050405020304" pitchFamily="18" charset="0"/>
+              </a:rPr>
+              <a:t>of our </a:t>
+            </a:r>
+            <a:r>
+              <a:rPr lang="en-US" sz="1200" dirty="0" smtClean="0">
+                <a:effectLst/>
+                <a:latin typeface="Cambria" panose="02040503050406030204" pitchFamily="18" charset="0"/>
+                <a:ea typeface="Cambria" panose="02040503050406030204" pitchFamily="18" charset="0"/>
+                <a:cs typeface="Times New Roman" panose="02020603050405020304" pitchFamily="18" charset="0"/>
+              </a:rPr>
+              <a:t>overall health</a:t>
+            </a:r>
+            <a:r>
+              <a:rPr lang="en-US" sz="1200" dirty="0" smtClean="0">
+                <a:effectLst/>
+                <a:latin typeface="Cambria" panose="02040503050406030204" pitchFamily="18" charset="0"/>
+                <a:ea typeface="Cambria" panose="02040503050406030204" pitchFamily="18" charset="0"/>
+                <a:cs typeface="Times New Roman" panose="02020603050405020304" pitchFamily="18" charset="0"/>
+              </a:rPr>
+              <a:t>.</a:t>
             </a:r>
             <a:endParaRPr lang="en-GB" sz="1200" dirty="0" smtClean="0">
               <a:effectLst/>
@@ -3699,7 +3932,7 @@
                 <a:ea typeface="Cambria" panose="02040503050406030204" pitchFamily="18" charset="0"/>
                 <a:cs typeface="Times New Roman" panose="02020603050405020304" pitchFamily="18" charset="0"/>
               </a:rPr>
-              <a:t>And yet for </a:t>
+              <a:t>And yet for rare or complex diseases</a:t>
             </a:r>
             <a:r>
               <a:rPr lang="en-US" sz="1200" dirty="0" smtClean="0">
@@ -3708,7 +3941,7 @@
                 <a:ea typeface="Cambria" panose="02040503050406030204" pitchFamily="18" charset="0"/>
                 <a:cs typeface="Times New Roman" panose="02020603050405020304" pitchFamily="18" charset="0"/>
               </a:rPr>
-              <a:t>rare or complex diseases: those that have causes driven by a combination of environmental and genetic causes, we will never have sufficient data to </a:t>
+              <a:t>: diseases that have </a:t>
             </a:r>
             <a:r>
               <a:rPr lang="en-US" sz="1200" dirty="0" smtClean="0">
@@ -3717,16 +3950,16 @@
                 <a:ea typeface="Cambria" panose="02040503050406030204" pitchFamily="18" charset="0"/>
                 <a:cs typeface="Times New Roman" panose="02020603050405020304" pitchFamily="18" charset="0"/>
               </a:rPr>
-              <a:t>learn. And</a:t>
-            </a:r>
-            <a:r>
-              <a:rPr lang="en-US" sz="1200" baseline="0" dirty="0" smtClean="0">
+              <a:t>causes driven by a combination of environmental and genetic causes, we </a:t>
+            </a:r>
+            <a:r>
+              <a:rPr lang="en-US" sz="1200" dirty="0" smtClean="0">
                 <a:effectLst/>
                 <a:latin typeface="Cambria" panose="02040503050406030204" pitchFamily="18" charset="0"/>
                 <a:ea typeface="Cambria" panose="02040503050406030204" pitchFamily="18" charset="0"/>
                 <a:cs typeface="Times New Roman" panose="02020603050405020304" pitchFamily="18" charset="0"/>
               </a:rPr>
-              <a:t> i</a:t>
+              <a:t>may </a:t>
             </a:r>
             <a:r>
               <a:rPr lang="en-US" sz="1200" dirty="0" smtClean="0">
@@ -3735,25 +3968,26 @@
                 <a:ea typeface="Cambria" panose="02040503050406030204" pitchFamily="18" charset="0"/>
                 <a:cs typeface="Times New Roman" panose="02020603050405020304" pitchFamily="18" charset="0"/>
               </a:rPr>
-              <a:t>t is obviously not ethical to cause people to become ill to</a:t>
-            </a:r>
-            <a:r>
-              <a:rPr lang="en-US" sz="1200" baseline="0" dirty="0" smtClean="0">
+              <a:t>never have sufficient data to </a:t>
+            </a:r>
+            <a:r>
+              <a:rPr lang="en-US" sz="1200" dirty="0" smtClean="0">
                 <a:effectLst/>
                 <a:latin typeface="Cambria" panose="02040503050406030204" pitchFamily="18" charset="0"/>
                 <a:ea typeface="Cambria" panose="02040503050406030204" pitchFamily="18" charset="0"/>
                 <a:cs typeface="Times New Roman" panose="02020603050405020304" pitchFamily="18" charset="0"/>
               </a:rPr>
-              <a:t> obtain more data.</a:t>
-            </a:r>
-            <a:endParaRPr lang="en-GB" sz="1200" dirty="0" smtClean="0">
-              <a:effectLst/>
-              <a:latin typeface="Cambria" panose="02040503050406030204" pitchFamily="18" charset="0"/>
-              <a:ea typeface="Cambria" panose="02040503050406030204" pitchFamily="18" charset="0"/>
-              <a:cs typeface="Times New Roman" panose="02020603050405020304" pitchFamily="18" charset="0"/>
-            </a:endParaRPr>
-          </a:p>
-          <a:p>
+              <a:t>learn</a:t>
+            </a:r>
+            <a:r>
+              <a:rPr lang="en-US" sz="1200" baseline="0" dirty="0" smtClean="0">
+                <a:effectLst/>
+                <a:latin typeface="Cambria" panose="02040503050406030204" pitchFamily="18" charset="0"/>
+                <a:ea typeface="Cambria" panose="02040503050406030204" pitchFamily="18" charset="0"/>
+                <a:cs typeface="Times New Roman" panose="02020603050405020304" pitchFamily="18" charset="0"/>
+              </a:rPr>
+              <a:t> unless we improve efficiency.</a:t>
+            </a:r>
             <a:endParaRPr lang="en-GB" dirty="0"/>
           </a:p>
         </p:txBody>
@@ -3865,7 +4099,67 @@
                 <a:ea typeface="+mn-ea"/>
                 <a:cs typeface="+mn-cs"/>
               </a:rPr>
-              <a:t>The steam engine is far more associated in our minds with the name of James Watt, Watt made the steam engine practical by introducing the separate condenser. Rather than directly injecting water into the cylinder he sucked the steam out of the cylinder and cooled it separately. This was more efficient as the cylinder itself no longer had to go through cycles of heating and cooling. The resulting doubling in efficiency made the steam engine practical, not just for </a:t>
+              <a:t>The steam engine is far more associated in our minds with the name of James </a:t>
+            </a:r>
+            <a:r>
+              <a:rPr lang="en-US" sz="1200" kern="1200" dirty="0" smtClean="0">
+                <a:solidFill>
+                  <a:schemeClr val="tx1"/>
+                </a:solidFill>
+                <a:effectLst/>
+                <a:latin typeface="+mn-lt"/>
+                <a:ea typeface="+mn-ea"/>
+                <a:cs typeface="+mn-cs"/>
+              </a:rPr>
+              <a:t>Watt than Thomas</a:t>
+            </a:r>
+            <a:r>
+              <a:rPr lang="en-US" sz="1200" kern="1200" baseline="0" dirty="0" smtClean="0">
+                <a:solidFill>
+                  <a:schemeClr val="tx1"/>
+                </a:solidFill>
+                <a:effectLst/>
+                <a:latin typeface="+mn-lt"/>
+                <a:ea typeface="+mn-ea"/>
+                <a:cs typeface="+mn-cs"/>
+              </a:rPr>
+              <a:t> </a:t>
+            </a:r>
+            <a:r>
+              <a:rPr lang="en-US" sz="1200" kern="1200" baseline="0" dirty="0" err="1" smtClean="0">
+                <a:solidFill>
+                  <a:schemeClr val="tx1"/>
+                </a:solidFill>
+                <a:effectLst/>
+                <a:latin typeface="+mn-lt"/>
+                <a:ea typeface="+mn-ea"/>
+                <a:cs typeface="+mn-cs"/>
+              </a:rPr>
+              <a:t>Newcomen</a:t>
+            </a:r>
+            <a:r>
+              <a:rPr lang="en-US" sz="1200" kern="1200" dirty="0" smtClean="0">
+                <a:solidFill>
+                  <a:schemeClr val="tx1"/>
+                </a:solidFill>
+                <a:effectLst/>
+                <a:latin typeface="+mn-lt"/>
+                <a:ea typeface="+mn-ea"/>
+                <a:cs typeface="+mn-cs"/>
+              </a:rPr>
+              <a:t>, </a:t>
+            </a:r>
+            <a:r>
+              <a:rPr lang="en-US" sz="1200" kern="1200" dirty="0" smtClean="0">
+                <a:solidFill>
+                  <a:schemeClr val="tx1"/>
+                </a:solidFill>
+                <a:effectLst/>
+                <a:latin typeface="+mn-lt"/>
+                <a:ea typeface="+mn-ea"/>
+                <a:cs typeface="+mn-cs"/>
+              </a:rPr>
+              <a:t>Watt made the steam engine practical by introducing the separate condenser. Rather than directly injecting water into the cylinder he sucked the steam out of the cylinder and cooled it separately. This was more efficient as the cylinder itself no longer had to go through cycles of heating and cooling. The resulting doubling in efficiency made the steam engine practical, not just for </a:t>
             </a:r>
             <a:r>
               <a:rPr lang="en-US" sz="1200" kern="1200" dirty="0" err="1" smtClean="0">
@@ -3931,7 +4225,19 @@
                 <a:ea typeface="+mn-ea"/>
                 <a:cs typeface="+mn-cs"/>
               </a:rPr>
-              <a:t>My definition of intelligence is the use of information to </a:t>
+              <a:t>My definition of intelligence is the use of information to save energy.</a:t>
+            </a:r>
+            <a:r>
+              <a:rPr lang="en-US" sz="1200" kern="1200" baseline="0" dirty="0" smtClean="0">
+                <a:solidFill>
+                  <a:schemeClr val="tx1"/>
+                </a:solidFill>
+                <a:effectLst/>
+                <a:latin typeface="+mn-lt"/>
+                <a:ea typeface="+mn-ea"/>
+                <a:cs typeface="+mn-cs"/>
+              </a:rPr>
+              <a:t> </a:t>
             </a:r>
             <a:r>
               <a:rPr lang="en-US" sz="1200" kern="1200" dirty="0" smtClean="0">
@@ -3943,43 +4249,7 @@
                 <a:ea typeface="+mn-ea"/>
                 <a:cs typeface="+mn-cs"/>
               </a:rPr>
-              <a:t>save energy.</a:t>
-            </a:r>
-            <a:r>
-              <a:rPr lang="en-US" sz="1200" kern="1200" baseline="0" dirty="0" smtClean="0">
-                <a:solidFill>
-                  <a:schemeClr val="tx1"/>
-                </a:solidFill>
-                <a:effectLst/>
-                <a:latin typeface="+mn-lt"/>
-                <a:ea typeface="+mn-ea"/>
-                <a:cs typeface="+mn-cs"/>
-              </a:rPr>
-              <a:t> </a:t>
-            </a:r>
-            <a:r>
-              <a:rPr lang="en-US" sz="1200" kern="1200" dirty="0" smtClean="0">
-                <a:solidFill>
-                  <a:schemeClr val="tx1"/>
-                </a:solidFill>
-                <a:effectLst/>
-                <a:latin typeface="+mn-lt"/>
-                <a:ea typeface="+mn-ea"/>
-                <a:cs typeface="+mn-cs"/>
-              </a:rPr>
-              <a:t>Intelligent </a:t>
-            </a:r>
-            <a:r>
-              <a:rPr lang="en-US" sz="1200" kern="1200" dirty="0" smtClean="0">
-                <a:solidFill>
-                  <a:schemeClr val="tx1"/>
-                </a:solidFill>
-                <a:effectLst/>
-                <a:latin typeface="+mn-lt"/>
-                <a:ea typeface="+mn-ea"/>
-                <a:cs typeface="+mn-cs"/>
-              </a:rPr>
-              <a:t>decision making implies that we assimilate the facts and make a decision that reduces our expenditure relative to actions we would have taken had we not had those facts.</a:t>
+              <a:t>Intelligent decision making implies that we assimilate the facts and make a decision that reduces our expenditure relative to actions we would have taken had we not had those facts.</a:t>
             </a:r>
             <a:endParaRPr lang="en-GB" sz="1200" kern="1200" dirty="0" smtClean="0">
               <a:solidFill>
@@ -4047,7 +4317,19 @@
                 <a:ea typeface="+mn-ea"/>
                 <a:cs typeface="+mn-cs"/>
               </a:rPr>
-              <a:t>In a very real sense there is currently a data efficiency deficit, just as </a:t>
+              <a:t>In a very real sense there is currently a data efficiency deficit, just as large as, if not larger than, the engine efficiency deficit in </a:t>
+            </a:r>
+            <a:r>
+              <a:rPr lang="en-US" sz="1200" kern="1200" dirty="0" err="1" smtClean="0">
+                <a:solidFill>
+                  <a:schemeClr val="tx1"/>
+                </a:solidFill>
+                <a:effectLst/>
+                <a:latin typeface="+mn-lt"/>
+                <a:ea typeface="+mn-ea"/>
+                <a:cs typeface="+mn-cs"/>
+              </a:rPr>
+              <a:t>Newcomen's</a:t>
             </a:r>
             <a:r>
               <a:rPr lang="en-US" sz="1200" kern="1200" dirty="0" smtClean="0">
@@ -4059,7 +4341,19 @@
                 <a:ea typeface="+mn-ea"/>
                 <a:cs typeface="+mn-cs"/>
               </a:rPr>
-              <a:t>large as, if not larger than, </a:t>
+              <a:t> engine.</a:t>
+            </a:r>
+            <a:r>
+              <a:rPr lang="en-US" sz="1200" kern="1200" baseline="0" dirty="0" smtClean="0">
+                <a:solidFill>
+                  <a:schemeClr val="tx1"/>
+                </a:solidFill>
+                <a:effectLst/>
+                <a:latin typeface="+mn-lt"/>
+                <a:ea typeface="+mn-ea"/>
+                <a:cs typeface="+mn-cs"/>
+              </a:rPr>
+              <a:t> </a:t>
             </a:r>
             <a:r>
               <a:rPr lang="en-US" sz="1200" kern="1200" dirty="0" smtClean="0">
@@ -4071,115 +4365,7 @@
                 <a:ea typeface="+mn-ea"/>
                 <a:cs typeface="+mn-cs"/>
               </a:rPr>
-              <a:t>the engine efficiency </a:t>
-            </a:r>
-            <a:r>
-              <a:rPr lang="en-US" sz="1200" kern="1200" dirty="0" smtClean="0">
-                <a:solidFill>
-                  <a:schemeClr val="tx1"/>
-                </a:solidFill>
-                <a:effectLst/>
-                <a:latin typeface="+mn-lt"/>
-                <a:ea typeface="+mn-ea"/>
-                <a:cs typeface="+mn-cs"/>
-              </a:rPr>
-              <a:t>deficit </a:t>
-            </a:r>
-            <a:r>
-              <a:rPr lang="en-US" sz="1200" kern="1200" dirty="0" smtClean="0">
-                <a:solidFill>
-                  <a:schemeClr val="tx1"/>
-                </a:solidFill>
-                <a:effectLst/>
-                <a:latin typeface="+mn-lt"/>
-                <a:ea typeface="+mn-ea"/>
-                <a:cs typeface="+mn-cs"/>
-              </a:rPr>
-              <a:t>in </a:t>
-            </a:r>
-            <a:r>
-              <a:rPr lang="en-US" sz="1200" kern="1200" dirty="0" err="1" smtClean="0">
-                <a:solidFill>
-                  <a:schemeClr val="tx1"/>
-                </a:solidFill>
-                <a:effectLst/>
-                <a:latin typeface="+mn-lt"/>
-                <a:ea typeface="+mn-ea"/>
-                <a:cs typeface="+mn-cs"/>
-              </a:rPr>
-              <a:t>Newcomen's</a:t>
-            </a:r>
-            <a:r>
-              <a:rPr lang="en-US" sz="1200" kern="1200" dirty="0" smtClean="0">
-                <a:solidFill>
-                  <a:schemeClr val="tx1"/>
-                </a:solidFill>
-                <a:effectLst/>
-                <a:latin typeface="+mn-lt"/>
-                <a:ea typeface="+mn-ea"/>
-                <a:cs typeface="+mn-cs"/>
-              </a:rPr>
-              <a:t> </a:t>
-            </a:r>
-            <a:r>
-              <a:rPr lang="en-US" sz="1200" kern="1200" dirty="0" smtClean="0">
-                <a:solidFill>
-                  <a:schemeClr val="tx1"/>
-                </a:solidFill>
-                <a:effectLst/>
-                <a:latin typeface="+mn-lt"/>
-                <a:ea typeface="+mn-ea"/>
-                <a:cs typeface="+mn-cs"/>
-              </a:rPr>
-              <a:t>engine.</a:t>
-            </a:r>
-            <a:r>
-              <a:rPr lang="en-US" sz="1200" kern="1200" baseline="0" dirty="0" smtClean="0">
-                <a:solidFill>
-                  <a:schemeClr val="tx1"/>
-                </a:solidFill>
-                <a:effectLst/>
-                <a:latin typeface="+mn-lt"/>
-                <a:ea typeface="+mn-ea"/>
-                <a:cs typeface="+mn-cs"/>
-              </a:rPr>
-              <a:t> </a:t>
-            </a:r>
-            <a:r>
-              <a:rPr lang="en-US" sz="1200" kern="1200" dirty="0" smtClean="0">
-                <a:solidFill>
-                  <a:schemeClr val="tx1"/>
-                </a:solidFill>
-                <a:effectLst/>
-                <a:latin typeface="+mn-lt"/>
-                <a:ea typeface="+mn-ea"/>
-                <a:cs typeface="+mn-cs"/>
-              </a:rPr>
-              <a:t>What </a:t>
-            </a:r>
-            <a:r>
-              <a:rPr lang="en-US" sz="1200" kern="1200" dirty="0" smtClean="0">
-                <a:solidFill>
-                  <a:schemeClr val="tx1"/>
-                </a:solidFill>
-                <a:effectLst/>
-                <a:latin typeface="+mn-lt"/>
-                <a:ea typeface="+mn-ea"/>
-                <a:cs typeface="+mn-cs"/>
-              </a:rPr>
-              <a:t>we require is a revolution in data efficiency equivalent to Watt's separate condenser </a:t>
-            </a:r>
-            <a:r>
-              <a:rPr lang="en-US" sz="1200" kern="1200" dirty="0" smtClean="0">
-                <a:solidFill>
-                  <a:schemeClr val="tx1"/>
-                </a:solidFill>
-                <a:effectLst/>
-                <a:latin typeface="+mn-lt"/>
-                <a:ea typeface="+mn-ea"/>
-                <a:cs typeface="+mn-cs"/>
-              </a:rPr>
-              <a:t>moment.</a:t>
+              <a:t>What we require is a revolution in data efficiency equivalent to Watt's separate condenser moment.</a:t>
             </a:r>
             <a:r>
               <a:rPr lang="en-GB" sz="1200" kern="1200" baseline="0" dirty="0" smtClean="0">
@@ -4388,6 +4574,18 @@
               <a:t>This diagram is from the </a:t>
             </a:r>
             <a:r>
+              <a:rPr lang="en-US" sz="1200" kern="1200" baseline="0" dirty="0" smtClean="0">
+                <a:solidFill>
+                  <a:schemeClr val="tx1"/>
+                </a:solidFill>
+                <a:effectLst/>
+                <a:latin typeface="+mn-lt"/>
+                <a:ea typeface="+mn-ea"/>
+                <a:cs typeface="+mn-cs"/>
+              </a:rPr>
+              <a:t>‘</a:t>
+            </a:r>
+            <a:r>
               <a:rPr lang="en-US" sz="1200" kern="1200" baseline="0" dirty="0" err="1" smtClean="0">
                 <a:solidFill>
                   <a:schemeClr val="tx1"/>
@@ -4409,7 +4607,19 @@
                 <a:ea typeface="+mn-ea"/>
                 <a:cs typeface="+mn-cs"/>
               </a:rPr>
-              <a:t> paper: </a:t>
+              <a:t>’ </a:t>
+            </a:r>
+            <a:r>
+              <a:rPr lang="en-US" sz="1200" kern="1200" baseline="0" dirty="0" smtClean="0">
+                <a:solidFill>
+                  <a:schemeClr val="tx1"/>
+                </a:solidFill>
+                <a:effectLst/>
+                <a:latin typeface="+mn-lt"/>
+                <a:ea typeface="+mn-ea"/>
+                <a:cs typeface="+mn-cs"/>
+              </a:rPr>
+              <a:t>paper: </a:t>
             </a:r>
             <a:r>
               <a:rPr lang="en-US" sz="1200" kern="1200" baseline="0" dirty="0" err="1" smtClean="0">
@@ -4421,7 +4631,7 @@
                 <a:ea typeface="+mn-ea"/>
                 <a:cs typeface="+mn-cs"/>
               </a:rPr>
-              <a:t>facebook’s</a:t>
+              <a:t>DeepFace</a:t>
             </a:r>
             <a:r>
               <a:rPr lang="en-US" sz="1200" kern="1200" baseline="0" dirty="0" smtClean="0">
@@ -4433,7 +4643,19 @@
                 <a:ea typeface="+mn-ea"/>
                 <a:cs typeface="+mn-cs"/>
               </a:rPr>
-              <a:t> face recognition paper that achieved near human performance with a training set of 1 billion faces.</a:t>
+              <a:t> is Facebook’s </a:t>
+            </a:r>
+            <a:r>
+              <a:rPr lang="en-US" sz="1200" kern="1200" baseline="0" dirty="0" smtClean="0">
+                <a:solidFill>
+                  <a:schemeClr val="tx1"/>
+                </a:solidFill>
+                <a:effectLst/>
+                <a:latin typeface="+mn-lt"/>
+                <a:ea typeface="+mn-ea"/>
+                <a:cs typeface="+mn-cs"/>
+              </a:rPr>
+              <a:t>face recognition paper that achieved near human performance with a training set of 1 billion faces.</a:t>
             </a:r>
           </a:p>
           <a:p>
@@ -4470,7 +4692,7 @@
                 <a:ea typeface="+mn-ea"/>
                 <a:cs typeface="+mn-cs"/>
               </a:rPr>
-              <a:t>prepreocessing</a:t>
+              <a:t>prepreprocessing</a:t>
             </a:r>
             <a:r>
               <a:rPr lang="en-US" sz="1200" kern="1200" baseline="0" dirty="0" smtClean="0">
@@ -4482,7 +4704,31 @@
                 <a:ea typeface="+mn-ea"/>
                 <a:cs typeface="+mn-cs"/>
               </a:rPr>
-              <a:t> of the face and then a series of cascaded transformations that eventually turn </a:t>
+              <a:t> </a:t>
+            </a:r>
+            <a:r>
+              <a:rPr lang="en-US" sz="1200" kern="1200" baseline="0" dirty="0" smtClean="0">
+                <a:solidFill>
+                  <a:schemeClr val="tx1"/>
+                </a:solidFill>
+                <a:effectLst/>
+                <a:latin typeface="+mn-lt"/>
+                <a:ea typeface="+mn-ea"/>
+                <a:cs typeface="+mn-cs"/>
+              </a:rPr>
+              <a:t>of the face and then a series of cascaded transformations that eventually </a:t>
+            </a:r>
+            <a:r>
+              <a:rPr lang="en-US" sz="1200" kern="1200" baseline="0" dirty="0" smtClean="0">
+                <a:solidFill>
+                  <a:schemeClr val="tx1"/>
+                </a:solidFill>
+                <a:effectLst/>
+                <a:latin typeface="+mn-lt"/>
+                <a:ea typeface="+mn-ea"/>
+                <a:cs typeface="+mn-cs"/>
+              </a:rPr>
+              <a:t>turn, in this case </a:t>
             </a:r>
             <a:r>
               <a:rPr lang="en-US" sz="1200" kern="1200" baseline="0" dirty="0" err="1" smtClean="0">
@@ -4530,10 +4776,44 @@
                 <a:ea typeface="+mn-ea"/>
                 <a:cs typeface="+mn-cs"/>
               </a:rPr>
-              <a:t> face into a label.</a:t>
-            </a:r>
-          </a:p>
-          <a:p>
+              <a:t> </a:t>
+            </a:r>
+            <a:r>
+              <a:rPr lang="en-US" sz="1200" kern="1200" baseline="0" dirty="0" smtClean="0">
+                <a:solidFill>
+                  <a:schemeClr val="tx1"/>
+                </a:solidFill>
+                <a:effectLst/>
+                <a:latin typeface="+mn-lt"/>
+                <a:ea typeface="+mn-ea"/>
+                <a:cs typeface="+mn-cs"/>
+              </a:rPr>
+              <a:t>face, </a:t>
+            </a:r>
+            <a:r>
+              <a:rPr lang="en-US" sz="1200" kern="1200" baseline="0" dirty="0" smtClean="0">
+                <a:solidFill>
+                  <a:schemeClr val="tx1"/>
+                </a:solidFill>
+                <a:effectLst/>
+                <a:latin typeface="+mn-lt"/>
+                <a:ea typeface="+mn-ea"/>
+                <a:cs typeface="+mn-cs"/>
+              </a:rPr>
+              <a:t>into a </a:t>
+            </a:r>
+            <a:r>
+              <a:rPr lang="en-US" sz="1200" kern="1200" baseline="0" dirty="0" smtClean="0">
+                <a:solidFill>
+                  <a:schemeClr val="tx1"/>
+                </a:solidFill>
+                <a:effectLst/>
+                <a:latin typeface="+mn-lt"/>
+                <a:ea typeface="+mn-ea"/>
+                <a:cs typeface="+mn-cs"/>
+              </a:rPr>
+              <a:t>‘yes’ or a ‘no’.</a:t>
+            </a:r>
             <a:endParaRPr lang="en-US" sz="1200" kern="1200" baseline="0" dirty="0" smtClean="0">
               <a:solidFill>
                 <a:schemeClr val="tx1"/>
@@ -4545,20 +4825,6 @@
             </a:endParaRPr>
           </a:p>
           <a:p>
-            <a:r>
-              <a:rPr lang="en-US" sz="1200" kern="1200" baseline="0" dirty="0" smtClean="0">
-                <a:solidFill>
-                  <a:schemeClr val="tx1"/>
-                </a:solidFill>
-                <a:effectLst/>
-                <a:latin typeface="+mn-lt"/>
-                <a:ea typeface="+mn-ea"/>
-                <a:cs typeface="+mn-cs"/>
-              </a:rPr>
-              <a:t>From a mathematical perspective we can think of this as a deterministic process, indeed it is a mathematical composition of simple processes. That’s what ‘deep learning’ is: mathematical composition of simple deterministic processes. </a:t>
-            </a:r>
-          </a:p>
-          <a:p>
             <a:endParaRPr lang="en-US" sz="1200" kern="1200" baseline="0" dirty="0" smtClean="0">
               <a:solidFill>
                 <a:schemeClr val="tx1"/>
@@ -4571,6 +4837,31 @@
           </a:p>
           <a:p>
             <a:r>
+              <a:rPr lang="en-US" sz="1200" kern="1200" baseline="0" dirty="0" smtClean="0">
+                <a:solidFill>
+                  <a:schemeClr val="tx1"/>
+                </a:solidFill>
+                <a:effectLst/>
+                <a:latin typeface="+mn-lt"/>
+                <a:ea typeface="+mn-ea"/>
+                <a:cs typeface="+mn-cs"/>
+              </a:rPr>
+              <a:t>From a mathematical perspective we can think of this as a deterministic process, indeed it is a mathematical composition of simple processes. That’s what ‘deep learning’ is: mathematical composition of simple deterministic processes. </a:t>
+            </a:r>
+          </a:p>
+          <a:p>
+            <a:endParaRPr lang="en-US" sz="1200" kern="1200" baseline="0" dirty="0" smtClean="0">
+              <a:solidFill>
+                <a:schemeClr val="tx1"/>
+              </a:solidFill>
+              <a:effectLst/>
+              <a:latin typeface="+mn-lt"/>
+              <a:ea typeface="+mn-ea"/>
+              <a:cs typeface="+mn-cs"/>
+            </a:endParaRPr>
+          </a:p>
+          <a:p>
+            <a:r>
               <a:rPr lang="en-US" sz="1200" kern="1200" dirty="0" smtClean="0">
                 <a:solidFill>
                   <a:schemeClr val="tx1"/>
@@ -4604,7 +4895,19 @@
                 <a:ea typeface="+mn-ea"/>
                 <a:cs typeface="+mn-cs"/>
               </a:rPr>
-              <a:t> </a:t>
+              <a:t> related to the brain or presented</a:t>
+            </a:r>
+            <a:r>
+              <a:rPr lang="en-US" sz="1200" kern="1200" baseline="0" dirty="0" smtClean="0">
+                <a:solidFill>
+                  <a:schemeClr val="tx1"/>
+                </a:solidFill>
+                <a:effectLst/>
+                <a:latin typeface="+mn-lt"/>
+                <a:ea typeface="+mn-ea"/>
+                <a:cs typeface="+mn-cs"/>
+              </a:rPr>
+              <a:t> as a</a:t>
             </a:r>
             <a:r>
               <a:rPr lang="en-US" sz="1200" kern="1200" dirty="0" smtClean="0">
@@ -4616,79 +4919,7 @@
                 <a:ea typeface="+mn-ea"/>
                 <a:cs typeface="+mn-cs"/>
               </a:rPr>
-              <a:t>related to the brain or </a:t>
-            </a:r>
-            <a:r>
-              <a:rPr lang="en-US" sz="1200" kern="1200" dirty="0" smtClean="0">
-                <a:solidFill>
-                  <a:schemeClr val="tx1"/>
-                </a:solidFill>
-                <a:effectLst/>
-                <a:latin typeface="+mn-lt"/>
-                <a:ea typeface="+mn-ea"/>
-                <a:cs typeface="+mn-cs"/>
-              </a:rPr>
-              <a:t>presented</a:t>
-            </a:r>
-            <a:r>
-              <a:rPr lang="en-US" sz="1200" kern="1200" baseline="0" dirty="0" smtClean="0">
-                <a:solidFill>
-                  <a:schemeClr val="tx1"/>
-                </a:solidFill>
-                <a:effectLst/>
-                <a:latin typeface="+mn-lt"/>
-                <a:ea typeface="+mn-ea"/>
-                <a:cs typeface="+mn-cs"/>
-              </a:rPr>
-              <a:t> as a</a:t>
-            </a:r>
-            <a:r>
-              <a:rPr lang="en-US" sz="1200" kern="1200" dirty="0" smtClean="0">
-                <a:solidFill>
-                  <a:schemeClr val="tx1"/>
-                </a:solidFill>
-                <a:effectLst/>
-                <a:latin typeface="+mn-lt"/>
-                <a:ea typeface="+mn-ea"/>
-                <a:cs typeface="+mn-cs"/>
-              </a:rPr>
-              <a:t> </a:t>
-            </a:r>
-            <a:r>
-              <a:rPr lang="en-US" sz="1200" kern="1200" dirty="0" smtClean="0">
-                <a:solidFill>
-                  <a:schemeClr val="tx1"/>
-                </a:solidFill>
-                <a:effectLst/>
-                <a:latin typeface="+mn-lt"/>
-                <a:ea typeface="+mn-ea"/>
-                <a:cs typeface="+mn-cs"/>
-              </a:rPr>
-              <a:t>fundamental way of thinking about AI, but we can simply think of it as a sensible idea of applying a set of simple transformations to an image to </a:t>
-            </a:r>
-            <a:r>
-              <a:rPr lang="en-US" sz="1200" kern="1200" dirty="0" smtClean="0">
-                <a:solidFill>
-                  <a:schemeClr val="tx1"/>
-                </a:solidFill>
-                <a:effectLst/>
-                <a:latin typeface="+mn-lt"/>
-                <a:ea typeface="+mn-ea"/>
-                <a:cs typeface="+mn-cs"/>
-              </a:rPr>
-              <a:t>build </a:t>
-            </a:r>
-            <a:r>
-              <a:rPr lang="en-US" sz="1200" kern="1200" dirty="0" smtClean="0">
-                <a:solidFill>
-                  <a:schemeClr val="tx1"/>
-                </a:solidFill>
-                <a:effectLst/>
-                <a:latin typeface="+mn-lt"/>
-                <a:ea typeface="+mn-ea"/>
-                <a:cs typeface="+mn-cs"/>
-              </a:rPr>
-              <a:t>a complex transformation.</a:t>
+              <a:t> fundamental way of thinking about AI, but we can simply think of it as a sensible idea of applying a set of simple transformations to an image to build a complex transformation.</a:t>
             </a:r>
           </a:p>
           <a:p>
@@ -4949,19 +5180,7 @@
                 <a:ea typeface="+mn-ea"/>
                 <a:cs typeface="+mn-cs"/>
               </a:rPr>
-              <a:t>So a deep </a:t>
-            </a:r>
-            <a:r>
-              <a:rPr lang="en-US" sz="1200" kern="1200" dirty="0" smtClean="0">
-                <a:solidFill>
-                  <a:schemeClr val="tx1"/>
-                </a:solidFill>
-                <a:effectLst/>
-                <a:latin typeface="+mn-lt"/>
-                <a:ea typeface="+mn-ea"/>
-                <a:cs typeface="+mn-cs"/>
-              </a:rPr>
-              <a:t>model is like a Pachinko machine, but one where we have control over the location of the pins. The objective in deep learning is to move the pins around in such a way that for the right set of initial conditions, the correct result is achieved.</a:t>
+              <a:t>So a deep model is like a Pachinko machine, but one where we have control over the location of the pins. The objective in deep learning is to move the pins around in such a way that for the right set of initial conditions, the correct result is achieved.</a:t>
             </a:r>
             <a:endParaRPr lang="en-GB" sz="1200" kern="1200" dirty="0" smtClean="0">
               <a:solidFill>
@@ -4995,7 +5214,19 @@
                 <a:ea typeface="+mn-ea"/>
                 <a:cs typeface="+mn-cs"/>
               </a:rPr>
-              <a:t>The </a:t>
+              <a:t>The network weights are like the positions of the pins. So we can think of </a:t>
+            </a:r>
+            <a:r>
+              <a:rPr lang="en-US" sz="1200" kern="1200" dirty="0" err="1" smtClean="0">
+                <a:solidFill>
+                  <a:schemeClr val="tx1"/>
+                </a:solidFill>
+                <a:effectLst/>
+                <a:latin typeface="+mn-lt"/>
+                <a:ea typeface="+mn-ea"/>
+                <a:cs typeface="+mn-cs"/>
+              </a:rPr>
+              <a:t>DeepFace</a:t>
             </a:r>
             <a:r>
               <a:rPr lang="en-US" sz="1200" kern="1200" dirty="0" smtClean="0">
@@ -5007,7 +5238,31 @@
                 <a:ea typeface="+mn-ea"/>
                 <a:cs typeface="+mn-cs"/>
               </a:rPr>
-              <a:t>network weights are like the positions of the pins. So we can think of </a:t>
+              <a:t> having 120 million pins. Of course our pin ball system is only one dimensional,</a:t>
+            </a:r>
+            <a:r>
+              <a:rPr lang="en-US" sz="1200" kern="1200" baseline="0" dirty="0" smtClean="0">
+                <a:solidFill>
+                  <a:schemeClr val="tx1"/>
+                </a:solidFill>
+                <a:effectLst/>
+                <a:latin typeface="+mn-lt"/>
+                <a:ea typeface="+mn-ea"/>
+                <a:cs typeface="+mn-cs"/>
+              </a:rPr>
+              <a:t> r</a:t>
+            </a:r>
+            <a:r>
+              <a:rPr lang="en-US" sz="1200" kern="1200" dirty="0" smtClean="0">
+                <a:solidFill>
+                  <a:schemeClr val="tx1"/>
+                </a:solidFill>
+                <a:effectLst/>
+                <a:latin typeface="+mn-lt"/>
+                <a:ea typeface="+mn-ea"/>
+                <a:cs typeface="+mn-cs"/>
+              </a:rPr>
+              <a:t>eal deep networks have many </a:t>
             </a:r>
             <a:r>
               <a:rPr lang="en-US" sz="1200" kern="1200" dirty="0" err="1" smtClean="0">
@@ -5019,7 +5274,7 @@
                 <a:ea typeface="+mn-ea"/>
                 <a:cs typeface="+mn-cs"/>
               </a:rPr>
-              <a:t>DeepFace</a:t>
+              <a:t>many</a:t>
             </a:r>
             <a:r>
               <a:rPr lang="en-US" sz="1200" kern="1200" dirty="0" smtClean="0">
@@ -5031,7 +5286,19 @@
                 <a:ea typeface="+mn-ea"/>
                 <a:cs typeface="+mn-cs"/>
               </a:rPr>
-              <a:t> having 120 million pins. Of course </a:t>
+              <a:t> dimensions.</a:t>
+            </a:r>
+            <a:r>
+              <a:rPr lang="en-US" sz="1200" kern="1200" baseline="0" dirty="0" smtClean="0">
+                <a:solidFill>
+                  <a:schemeClr val="tx1"/>
+                </a:solidFill>
+                <a:effectLst/>
+                <a:latin typeface="+mn-lt"/>
+                <a:ea typeface="+mn-ea"/>
+                <a:cs typeface="+mn-cs"/>
+              </a:rPr>
+              <a:t> The deep network is</a:t>
             </a:r>
             <a:r>
               <a:rPr lang="en-US" sz="1200" kern="1200" dirty="0" smtClean="0">
@@ -5043,127 +5310,7 @@
                 <a:ea typeface="+mn-ea"/>
                 <a:cs typeface="+mn-cs"/>
               </a:rPr>
-              <a:t>our pin ball system is only one dimensional,</a:t>
-            </a:r>
-            <a:r>
-              <a:rPr lang="en-US" sz="1200" kern="1200" baseline="0" dirty="0" smtClean="0">
-                <a:solidFill>
-                  <a:schemeClr val="tx1"/>
-                </a:solidFill>
-                <a:effectLst/>
-                <a:latin typeface="+mn-lt"/>
-                <a:ea typeface="+mn-ea"/>
-                <a:cs typeface="+mn-cs"/>
-              </a:rPr>
-              <a:t> r</a:t>
-            </a:r>
-            <a:r>
-              <a:rPr lang="en-US" sz="1200" kern="1200" dirty="0" smtClean="0">
-                <a:solidFill>
-                  <a:schemeClr val="tx1"/>
-                </a:solidFill>
-                <a:effectLst/>
-                <a:latin typeface="+mn-lt"/>
-                <a:ea typeface="+mn-ea"/>
-                <a:cs typeface="+mn-cs"/>
-              </a:rPr>
-              <a:t>eal </a:t>
-            </a:r>
-            <a:r>
-              <a:rPr lang="en-US" sz="1200" kern="1200" dirty="0" smtClean="0">
-                <a:solidFill>
-                  <a:schemeClr val="tx1"/>
-                </a:solidFill>
-                <a:effectLst/>
-                <a:latin typeface="+mn-lt"/>
-                <a:ea typeface="+mn-ea"/>
-                <a:cs typeface="+mn-cs"/>
-              </a:rPr>
-              <a:t>deep networks have many </a:t>
-            </a:r>
-            <a:r>
-              <a:rPr lang="en-US" sz="1200" kern="1200" dirty="0" err="1" smtClean="0">
-                <a:solidFill>
-                  <a:schemeClr val="tx1"/>
-                </a:solidFill>
-                <a:effectLst/>
-                <a:latin typeface="+mn-lt"/>
-                <a:ea typeface="+mn-ea"/>
-                <a:cs typeface="+mn-cs"/>
-              </a:rPr>
-              <a:t>many</a:t>
-            </a:r>
-            <a:r>
-              <a:rPr lang="en-US" sz="1200" kern="1200" dirty="0" smtClean="0">
-                <a:solidFill>
-                  <a:schemeClr val="tx1"/>
-                </a:solidFill>
-                <a:effectLst/>
-                <a:latin typeface="+mn-lt"/>
-                <a:ea typeface="+mn-ea"/>
-                <a:cs typeface="+mn-cs"/>
-              </a:rPr>
-              <a:t> </a:t>
-            </a:r>
-            <a:r>
-              <a:rPr lang="en-US" sz="1200" kern="1200" dirty="0" smtClean="0">
-                <a:solidFill>
-                  <a:schemeClr val="tx1"/>
-                </a:solidFill>
-                <a:effectLst/>
-                <a:latin typeface="+mn-lt"/>
-                <a:ea typeface="+mn-ea"/>
-                <a:cs typeface="+mn-cs"/>
-              </a:rPr>
-              <a:t>dimensions.</a:t>
-            </a:r>
-            <a:r>
-              <a:rPr lang="en-US" sz="1200" kern="1200" baseline="0" dirty="0" smtClean="0">
-                <a:solidFill>
-                  <a:schemeClr val="tx1"/>
-                </a:solidFill>
-                <a:effectLst/>
-                <a:latin typeface="+mn-lt"/>
-                <a:ea typeface="+mn-ea"/>
-                <a:cs typeface="+mn-cs"/>
-              </a:rPr>
-              <a:t> The deep network is</a:t>
-            </a:r>
-            <a:r>
-              <a:rPr lang="en-US" sz="1200" kern="1200" dirty="0" smtClean="0">
-                <a:solidFill>
-                  <a:schemeClr val="tx1"/>
-                </a:solidFill>
-                <a:effectLst/>
-                <a:latin typeface="+mn-lt"/>
-                <a:ea typeface="+mn-ea"/>
-                <a:cs typeface="+mn-cs"/>
-              </a:rPr>
-              <a:t> </a:t>
-            </a:r>
-            <a:r>
-              <a:rPr lang="en-US" sz="1200" kern="1200" dirty="0" smtClean="0">
-                <a:solidFill>
-                  <a:schemeClr val="tx1"/>
-                </a:solidFill>
-                <a:effectLst/>
-                <a:latin typeface="+mn-lt"/>
-                <a:ea typeface="+mn-ea"/>
-                <a:cs typeface="+mn-cs"/>
-              </a:rPr>
-              <a:t>like a Pachinko machine where the pins are in a high dimensional space, and the ball drops through the high dimensional </a:t>
-            </a:r>
-            <a:r>
-              <a:rPr lang="en-US" sz="1200" kern="1200" dirty="0" smtClean="0">
-                <a:solidFill>
-                  <a:schemeClr val="tx1"/>
-                </a:solidFill>
-                <a:effectLst/>
-                <a:latin typeface="+mn-lt"/>
-                <a:ea typeface="+mn-ea"/>
-                <a:cs typeface="+mn-cs"/>
-              </a:rPr>
-              <a:t>space</a:t>
+              <a:t> like a Pachinko machine where the pins are in a high dimensional space, and the ball drops through the high dimensional space</a:t>
             </a:r>
             <a:r>
               <a:rPr lang="en-US" sz="1200" kern="1200" baseline="0" dirty="0" smtClean="0">
@@ -5233,7 +5380,19 @@
                 <a:ea typeface="+mn-ea"/>
                 <a:cs typeface="+mn-cs"/>
               </a:rPr>
-              <a:t>we </a:t>
+              <a:t>we need to explore full range of initial conditions we wish to test</a:t>
+            </a:r>
+            <a:r>
+              <a:rPr lang="en-US" sz="1200" kern="1200" baseline="0" dirty="0" smtClean="0">
+                <a:solidFill>
+                  <a:schemeClr val="tx1"/>
+                </a:solidFill>
+                <a:effectLst/>
+                <a:latin typeface="+mn-lt"/>
+                <a:ea typeface="+mn-ea"/>
+                <a:cs typeface="+mn-cs"/>
+              </a:rPr>
+              <a:t> the machine on,</a:t>
             </a:r>
             <a:r>
               <a:rPr lang="en-US" sz="1200" kern="1200" dirty="0" smtClean="0">
@@ -5245,101 +5404,8 @@
                 <a:ea typeface="+mn-ea"/>
                 <a:cs typeface="+mn-cs"/>
               </a:rPr>
-              <a:t>need to explore full range of initial </a:t>
-            </a:r>
-            <a:r>
-              <a:rPr lang="en-US" sz="1200" kern="1200" dirty="0" smtClean="0">
-                <a:solidFill>
-                  <a:schemeClr val="tx1"/>
-                </a:solidFill>
-                <a:effectLst/>
-                <a:latin typeface="+mn-lt"/>
-                <a:ea typeface="+mn-ea"/>
-                <a:cs typeface="+mn-cs"/>
-              </a:rPr>
-              <a:t>conditions </a:t>
-            </a:r>
-            <a:r>
-              <a:rPr lang="en-US" sz="1200" kern="1200" dirty="0" smtClean="0">
-                <a:solidFill>
-                  <a:schemeClr val="tx1"/>
-                </a:solidFill>
-                <a:effectLst/>
-                <a:latin typeface="+mn-lt"/>
-                <a:ea typeface="+mn-ea"/>
-                <a:cs typeface="+mn-cs"/>
-              </a:rPr>
-              <a:t>we wish to </a:t>
-            </a:r>
-            <a:r>
-              <a:rPr lang="en-US" sz="1200" kern="1200" dirty="0" smtClean="0">
-                <a:solidFill>
-                  <a:schemeClr val="tx1"/>
-                </a:solidFill>
-                <a:effectLst/>
-                <a:latin typeface="+mn-lt"/>
-                <a:ea typeface="+mn-ea"/>
-                <a:cs typeface="+mn-cs"/>
-              </a:rPr>
-              <a:t>test</a:t>
-            </a:r>
-            <a:r>
-              <a:rPr lang="en-US" sz="1200" kern="1200" baseline="0" dirty="0" smtClean="0">
-                <a:solidFill>
-                  <a:schemeClr val="tx1"/>
-                </a:solidFill>
-                <a:effectLst/>
-                <a:latin typeface="+mn-lt"/>
-                <a:ea typeface="+mn-ea"/>
-                <a:cs typeface="+mn-cs"/>
-              </a:rPr>
-              <a:t> the machine on,</a:t>
-            </a:r>
-            <a:r>
-              <a:rPr lang="en-US" sz="1200" kern="1200" dirty="0" smtClean="0">
-                <a:solidFill>
-                  <a:schemeClr val="tx1"/>
-                </a:solidFill>
-                <a:effectLst/>
-                <a:latin typeface="+mn-lt"/>
-                <a:ea typeface="+mn-ea"/>
-                <a:cs typeface="+mn-cs"/>
-              </a:rPr>
-              <a:t> </a:t>
-            </a:r>
-            <a:r>
-              <a:rPr lang="en-US" sz="1200" kern="1200" dirty="0" smtClean="0">
-                <a:solidFill>
-                  <a:schemeClr val="tx1"/>
-                </a:solidFill>
-                <a:effectLst/>
-                <a:latin typeface="+mn-lt"/>
-                <a:ea typeface="+mn-ea"/>
-                <a:cs typeface="+mn-cs"/>
-              </a:rPr>
-              <a:t>for images that must be very many</a:t>
-            </a:r>
-            <a:r>
-              <a:rPr lang="en-US" sz="1200" kern="1200" dirty="0" smtClean="0">
-                <a:solidFill>
-                  <a:schemeClr val="tx1"/>
-                </a:solidFill>
-                <a:effectLst/>
-                <a:latin typeface="+mn-lt"/>
-                <a:ea typeface="+mn-ea"/>
-                <a:cs typeface="+mn-cs"/>
-              </a:rPr>
-              <a:t>. That’s why we need so much data.</a:t>
-            </a:r>
-            <a:endParaRPr lang="en-US" sz="1200" kern="1200" dirty="0" smtClean="0">
-              <a:solidFill>
-                <a:schemeClr val="tx1"/>
-              </a:solidFill>
-              <a:effectLst/>
-              <a:latin typeface="+mn-lt"/>
-              <a:ea typeface="+mn-ea"/>
-              <a:cs typeface="+mn-cs"/>
-            </a:endParaRPr>
+              <a:t> for images that must be very many. That’s why we need so much data.</a:t>
+            </a:r>
           </a:p>
           <a:p>
             <a:endParaRPr lang="en-GB" sz="1200" kern="1200" dirty="0" smtClean="0">
@@ -5595,53 +5661,8 @@
                 <a:ea typeface="+mn-ea"/>
                 <a:cs typeface="+mn-cs"/>
               </a:rPr>
-              <a:t>This </a:t>
-            </a:r>
-            <a:r>
-              <a:rPr lang="en-US" sz="1200" kern="1200" dirty="0" smtClean="0">
-                <a:solidFill>
-                  <a:schemeClr val="tx1"/>
-                </a:solidFill>
-                <a:effectLst/>
-                <a:latin typeface="+mn-lt"/>
-                <a:ea typeface="+mn-ea"/>
-                <a:cs typeface="+mn-cs"/>
-              </a:rPr>
-              <a:t>is a path integral </a:t>
-            </a:r>
-            <a:r>
-              <a:rPr lang="en-US" sz="1200" kern="1200" dirty="0" smtClean="0">
-                <a:solidFill>
-                  <a:schemeClr val="tx1"/>
-                </a:solidFill>
-                <a:effectLst/>
-                <a:latin typeface="+mn-lt"/>
-                <a:ea typeface="+mn-ea"/>
-                <a:cs typeface="+mn-cs"/>
-              </a:rPr>
-              <a:t>interpretation </a:t>
-            </a:r>
-            <a:r>
-              <a:rPr lang="en-US" sz="1200" kern="1200" dirty="0" smtClean="0">
-                <a:solidFill>
-                  <a:schemeClr val="tx1"/>
-                </a:solidFill>
-                <a:effectLst/>
-                <a:latin typeface="+mn-lt"/>
-                <a:ea typeface="+mn-ea"/>
-                <a:cs typeface="+mn-cs"/>
-              </a:rPr>
-              <a:t>of the system. </a:t>
-            </a:r>
-            <a:endParaRPr lang="en-US" sz="1200" kern="1200" dirty="0" smtClean="0">
-              <a:solidFill>
-                <a:schemeClr val="tx1"/>
-              </a:solidFill>
-              <a:effectLst/>
-              <a:latin typeface="+mn-lt"/>
-              <a:ea typeface="+mn-ea"/>
-              <a:cs typeface="+mn-cs"/>
-            </a:endParaRPr>
+              <a:t>This is a path integral interpretation of the system. </a:t>
+            </a:r>
           </a:p>
           <a:p>
             <a:endParaRPr lang="en-US" sz="1200" kern="1200" dirty="0" smtClean="0">
@@ -5876,7 +5897,7 @@
           <a:p>
             <a:fld id="{32124550-43A1-4F5B-9B63-081BD619440E}" type="datetime1">
               <a:rPr lang="en-US" smtClean="0"/>
-              <a:t>3/19/2016</a:t>
+              <a:t>3/20/2016</a:t>
             </a:fld>
             <a:endParaRPr lang="en-US" dirty="0"/>
           </a:p>
@@ -6051,7 +6072,7 @@
           <a:p>
             <a:fld id="{0523F2B8-A949-4598-8AD9-19A96EB8FAD5}" type="datetime1">
               <a:rPr lang="en-US" smtClean="0"/>
-              <a:t>3/19/2016</a:t>
+              <a:t>3/20/2016</a:t>
             </a:fld>
             <a:endParaRPr lang="en-US" dirty="0"/>
           </a:p>
@@ -6236,7 +6257,7 @@
           <a:p>
             <a:fld id="{09D5553B-7220-4FDC-B00F-08A47422C641}" type="datetime1">
               <a:rPr lang="en-US" smtClean="0"/>
-              <a:t>3/19/2016</a:t>
+              <a:t>3/20/2016</a:t>
             </a:fld>
             <a:endParaRPr lang="en-US" dirty="0"/>
           </a:p>
@@ -6406,7 +6427,7 @@
           <a:p>
             <a:fld id="{9B9B318E-470B-4241-9A38-EC6A8E6AA87F}" type="datetime1">
               <a:rPr lang="en-US" smtClean="0"/>
-              <a:t>3/19/2016</a:t>
+              <a:t>3/20/2016</a:t>
             </a:fld>
             <a:endParaRPr lang="en-US" dirty="0"/>
           </a:p>
@@ -6657,7 +6678,7 @@
           <a:p>
             <a:fld id="{ED42B8E0-2E4A-48A7-B387-9828DBB7DE21}" type="datetime1">
               <a:rPr lang="en-US" smtClean="0"/>
-              <a:t>3/19/2016</a:t>
+              <a:t>3/20/2016</a:t>
             </a:fld>
             <a:endParaRPr lang="en-US" dirty="0"/>
           </a:p>
@@ -6950,7 +6971,7 @@
           <a:p>
             <a:fld id="{70DD4598-6FE9-47F0-A2DA-AC9CB239B163}" type="datetime1">
               <a:rPr lang="en-US" smtClean="0"/>
-              <a:t>3/19/2016</a:t>
+              <a:t>3/20/2016</a:t>
             </a:fld>
             <a:endParaRPr lang="en-US" dirty="0"/>
           </a:p>
@@ -7377,7 +7398,7 @@
           <a:p>
             <a:fld id="{DE1FF2BE-8E5F-46BE-8782-F9CAD349865B}" type="datetime1">
               <a:rPr lang="en-US" smtClean="0"/>
-              <a:t>3/19/2016</a:t>
+              <a:t>3/20/2016</a:t>
             </a:fld>
             <a:endParaRPr lang="en-US" dirty="0"/>
           </a:p>
@@ -7495,7 +7516,7 @@
           <a:p>
             <a:fld id="{BEF08B89-251B-45E2-8E8A-FA6A950336AA}" type="datetime1">
               <a:rPr lang="en-US" smtClean="0"/>
-              <a:t>3/19/2016</a:t>
+              <a:t>3/20/2016</a:t>
             </a:fld>
             <a:endParaRPr lang="en-US" dirty="0"/>
           </a:p>
@@ -7595,7 +7616,7 @@
           <a:p>
             <a:fld id="{60E4FE4B-BB9C-44EE-9340-1DA3D32C966B}" type="datetime1">
               <a:rPr lang="en-US" smtClean="0"/>
-              <a:t>3/19/2016</a:t>
+              <a:t>3/20/2016</a:t>
             </a:fld>
             <a:endParaRPr lang="en-US" dirty="0"/>
           </a:p>
@@ -7877,7 +7898,7 @@
           <a:p>
             <a:fld id="{F279130C-8A45-4EC4-B4F4-2C5513B1FA59}" type="datetime1">
               <a:rPr lang="en-US" smtClean="0"/>
-              <a:t>3/19/2016</a:t>
+              <a:t>3/20/2016</a:t>
             </a:fld>
             <a:endParaRPr lang="en-US" dirty="0"/>
           </a:p>
@@ -8135,7 +8156,7 @@
           <a:p>
             <a:fld id="{0E205DE6-E5F7-4E05-BE3B-DE67942DC961}" type="datetime1">
               <a:rPr lang="en-US" smtClean="0"/>
-              <a:t>3/19/2016</a:t>
+              <a:t>3/20/2016</a:t>
             </a:fld>
             <a:endParaRPr lang="en-US" dirty="0"/>
           </a:p>
@@ -8356,7 +8377,7 @@
           <a:p>
             <a:fld id="{77D209B3-A677-4676-8B11-C7EEB7683744}" type="datetime1">
               <a:rPr lang="en-US" smtClean="0"/>
-              <a:t>3/19/2016</a:t>
+              <a:t>3/20/2016</a:t>
             </a:fld>
             <a:endParaRPr lang="en-US" dirty="0"/>
           </a:p>

</xml_diff>